<commit_message>
Correct text book references on slide 2
</commit_message>
<xml_diff>
--- a/Slides-RPR/2019-H1-DAA-L41-BackTrack-Intro.pptx
+++ b/Slides-RPR/2019-H1-DAA-L41-BackTrack-Intro.pptx
@@ -7805,16 +7805,22 @@
               <a:t>Sec </a:t>
             </a:r>
             <a:r>
+              <a:rPr b="1" u="sng">
+                <a:latin typeface="Courier New"/>
+                <a:ea typeface="Courier New"/>
+                <a:cs typeface="Courier New"/>
+                <a:sym typeface="Courier New"/>
+              </a:rPr>
+              <a:t>7.</a:t>
+            </a:r>
+            <a:r>
               <a:rPr>
                 <a:latin typeface="Courier New"/>
                 <a:ea typeface="Courier New"/>
                 <a:cs typeface="Courier New"/>
                 <a:sym typeface="Courier New"/>
               </a:rPr>
-              <a:t>5.1,5.2,5.4,5.8,5.9</a:t>
-            </a:r>
-            <a:r>
-              <a:t> </a:t>
+              <a:t>1,7.2,7.3,7.4,7.5,8.2,11.1</a:t>
             </a:r>
           </a:p>
           <a:p>
@@ -7847,10 +7853,7 @@
                 <a:cs typeface="Courier New"/>
                 <a:sym typeface="Courier New"/>
               </a:rPr>
-              <a:t>8.2-8.4</a:t>
-            </a:r>
-            <a:r>
-              <a:t> </a:t>
+              <a:t>12.1,12.2</a:t>
             </a:r>
           </a:p>
           <a:p>
@@ -16276,50 +16279,50 @@
       </p:par>
     </p:tnLst>
     <p:bldLst>
+      <p:bldP build="whole" bldLvl="1" animBg="1" rev="0" advAuto="0" spid="97" grpId="40"/>
+      <p:bldP build="whole" bldLvl="1" animBg="1" rev="0" advAuto="0" spid="87" grpId="6"/>
+      <p:bldP build="whole" bldLvl="1" animBg="1" rev="0" advAuto="0" spid="86" grpId="4"/>
+      <p:bldP build="whole" bldLvl="1" animBg="1" rev="0" advAuto="0" spid="104" grpId="30"/>
+      <p:bldP build="whole" bldLvl="1" animBg="1" rev="0" advAuto="0" spid="84" grpId="3"/>
+      <p:bldP build="whole" bldLvl="1" animBg="1" rev="0" advAuto="0" spid="112" grpId="25"/>
+      <p:bldP build="whole" bldLvl="1" animBg="1" rev="0" advAuto="0" spid="89" grpId="13"/>
+      <p:bldP build="whole" bldLvl="1" animBg="1" rev="0" advAuto="0" spid="101" grpId="35"/>
+      <p:bldP build="whole" bldLvl="1" animBg="1" rev="0" advAuto="0" spid="99" grpId="37"/>
+      <p:bldP build="whole" bldLvl="1" animBg="1" rev="0" advAuto="0" spid="112" grpId="33"/>
+      <p:bldP build="whole" bldLvl="1" animBg="1" rev="0" advAuto="0" spid="103" grpId="29"/>
+      <p:bldP build="whole" bldLvl="1" animBg="1" rev="0" advAuto="0" spid="105" grpId="32"/>
+      <p:bldP build="whole" bldLvl="1" animBg="1" rev="0" advAuto="0" spid="92" grpId="14"/>
+      <p:bldP build="whole" bldLvl="1" animBg="1" rev="0" advAuto="0" spid="115" grpId="43"/>
+      <p:bldP build="whole" bldLvl="1" animBg="1" rev="0" advAuto="0" spid="109" grpId="10"/>
+      <p:bldP build="whole" bldLvl="1" animBg="1" rev="0" advAuto="0" spid="100" grpId="23"/>
+      <p:bldP build="whole" bldLvl="1" animBg="1" rev="0" advAuto="0" spid="90" grpId="12"/>
+      <p:bldP build="whole" bldLvl="1" animBg="1" rev="0" advAuto="0" spid="93" grpId="17"/>
+      <p:bldP build="whole" bldLvl="1" animBg="1" rev="0" advAuto="0" spid="117" grpId="45"/>
       <p:bldP build="whole" bldLvl="1" animBg="1" rev="0" advAuto="0" spid="102" grpId="26"/>
+      <p:bldP build="whole" bldLvl="1" animBg="1" rev="0" advAuto="0" spid="111" grpId="20"/>
+      <p:bldP build="whole" bldLvl="1" animBg="1" rev="0" advAuto="0" spid="100" grpId="39"/>
+      <p:bldP build="whole" bldLvl="1" animBg="1" rev="0" advAuto="0" spid="116" grpId="44"/>
+      <p:bldP build="whole" bldLvl="1" animBg="1" rev="0" advAuto="0" spid="108" grpId="5"/>
+      <p:bldP build="whole" bldLvl="1" animBg="1" rev="0" advAuto="0" spid="98" grpId="22"/>
+      <p:bldP build="whole" bldLvl="1" animBg="1" rev="0" advAuto="0" spid="110" grpId="15"/>
+      <p:bldP build="whole" bldLvl="1" animBg="1" rev="0" advAuto="0" spid="85" grpId="7"/>
+      <p:bldP build="whole" bldLvl="1" animBg="1" rev="0" advAuto="0" spid="102" grpId="34"/>
+      <p:bldP build="whole" bldLvl="1" animBg="1" rev="0" advAuto="0" spid="106" grpId="36"/>
+      <p:bldP build="whole" bldLvl="1" animBg="1" rev="0" advAuto="0" spid="82" grpId="2"/>
+      <p:bldP build="whole" bldLvl="1" animBg="1" rev="0" advAuto="0" spid="94" grpId="19"/>
+      <p:bldP build="whole" bldLvl="1" animBg="1" rev="0" advAuto="0" spid="97" grpId="24"/>
+      <p:bldP build="whole" bldLvl="1" animBg="1" rev="0" advAuto="0" spid="98" grpId="38"/>
+      <p:bldP build="whole" bldLvl="1" animBg="1" rev="0" advAuto="0" spid="107" grpId="1"/>
       <p:bldP build="whole" bldLvl="1" animBg="1" rev="0" advAuto="0" spid="88" grpId="9"/>
-      <p:bldP build="whole" bldLvl="1" animBg="1" rev="0" advAuto="0" spid="97" grpId="24"/>
-      <p:bldP build="whole" bldLvl="1" animBg="1" rev="0" advAuto="0" spid="109" grpId="10"/>
-      <p:bldP build="whole" bldLvl="1" animBg="1" rev="0" advAuto="0" spid="89" grpId="13"/>
-      <p:bldP build="whole" bldLvl="1" animBg="1" rev="0" advAuto="0" spid="112" grpId="33"/>
-      <p:bldP build="whole" bldLvl="1" animBg="1" rev="0" advAuto="0" spid="98" grpId="38"/>
-      <p:bldP build="whole" bldLvl="1" animBg="1" rev="0" advAuto="0" spid="111" grpId="20"/>
-      <p:bldP build="whole" bldLvl="1" animBg="1" rev="0" advAuto="0" spid="107" grpId="1"/>
-      <p:bldP build="whole" bldLvl="1" animBg="1" rev="0" advAuto="0" spid="90" grpId="12"/>
-      <p:bldP build="whole" bldLvl="1" animBg="1" rev="0" advAuto="0" spid="102" grpId="34"/>
       <p:bldP build="whole" bldLvl="1" animBg="1" rev="0" advAuto="0" spid="114" grpId="42"/>
-      <p:bldP build="whole" bldLvl="1" animBg="1" rev="0" advAuto="0" spid="116" grpId="44"/>
-      <p:bldP build="whole" bldLvl="1" animBg="1" rev="0" advAuto="0" spid="106" grpId="36"/>
+      <p:bldP build="whole" bldLvl="1" animBg="1" rev="0" advAuto="0" spid="83" grpId="8"/>
+      <p:bldP build="whole" bldLvl="1" animBg="1" rev="0" advAuto="0" spid="96" grpId="16"/>
+      <p:bldP build="whole" bldLvl="1" animBg="1" rev="0" advAuto="0" spid="99" grpId="21"/>
+      <p:bldP build="whole" bldLvl="1" animBg="1" rev="0" advAuto="0" spid="95" grpId="18"/>
+      <p:bldP build="whole" bldLvl="1" animBg="1" rev="0" advAuto="0" spid="91" grpId="11"/>
+      <p:bldP build="whole" bldLvl="1" animBg="1" rev="0" advAuto="0" spid="113" grpId="28"/>
       <p:bldP build="whole" bldLvl="1" animBg="1" rev="0" advAuto="0" spid="101" grpId="27"/>
-      <p:bldP build="whole" bldLvl="1" animBg="1" rev="0" advAuto="0" spid="97" grpId="40"/>
-      <p:bldP build="whole" bldLvl="1" animBg="1" rev="0" advAuto="0" spid="95" grpId="18"/>
-      <p:bldP build="whole" bldLvl="1" animBg="1" rev="0" advAuto="0" spid="101" grpId="35"/>
-      <p:bldP build="whole" bldLvl="1" animBg="1" rev="0" advAuto="0" spid="83" grpId="8"/>
-      <p:bldP build="whole" bldLvl="1" animBg="1" rev="0" advAuto="0" spid="84" grpId="3"/>
-      <p:bldP build="whole" bldLvl="1" animBg="1" rev="0" advAuto="0" spid="117" grpId="45"/>
-      <p:bldP build="whole" bldLvl="1" animBg="1" rev="0" advAuto="0" spid="100" grpId="23"/>
-      <p:bldP build="whole" bldLvl="1" animBg="1" rev="0" advAuto="0" spid="110" grpId="15"/>
-      <p:bldP build="whole" bldLvl="1" animBg="1" rev="0" advAuto="0" spid="105" grpId="32"/>
-      <p:bldP build="whole" bldLvl="1" animBg="1" rev="0" advAuto="0" spid="96" grpId="16"/>
       <p:bldP build="whole" bldLvl="1" animBg="1" rev="0" advAuto="0" spid="113" grpId="31"/>
-      <p:bldP build="whole" bldLvl="1" animBg="1" rev="0" advAuto="0" spid="92" grpId="14"/>
-      <p:bldP build="whole" bldLvl="1" animBg="1" rev="0" advAuto="0" spid="113" grpId="28"/>
-      <p:bldP build="whole" bldLvl="1" animBg="1" rev="0" advAuto="0" spid="115" grpId="43"/>
-      <p:bldP build="whole" bldLvl="1" animBg="1" rev="0" advAuto="0" spid="99" grpId="21"/>
-      <p:bldP build="whole" bldLvl="1" animBg="1" rev="0" advAuto="0" spid="103" grpId="29"/>
-      <p:bldP build="whole" bldLvl="1" animBg="1" rev="0" advAuto="0" spid="104" grpId="30"/>
-      <p:bldP build="whole" bldLvl="1" animBg="1" rev="0" advAuto="0" spid="87" grpId="6"/>
-      <p:bldP build="whole" bldLvl="1" animBg="1" rev="0" advAuto="0" spid="100" grpId="39"/>
-      <p:bldP build="whole" bldLvl="1" animBg="1" rev="0" advAuto="0" spid="82" grpId="2"/>
-      <p:bldP build="whole" bldLvl="1" animBg="1" rev="0" advAuto="0" spid="91" grpId="11"/>
-      <p:bldP build="whole" bldLvl="1" animBg="1" rev="0" advAuto="0" spid="85" grpId="7"/>
-      <p:bldP build="whole" bldLvl="1" animBg="1" rev="0" advAuto="0" spid="93" grpId="17"/>
-      <p:bldP build="whole" bldLvl="1" animBg="1" rev="0" advAuto="0" spid="98" grpId="22"/>
-      <p:bldP build="whole" bldLvl="1" animBg="1" rev="0" advAuto="0" spid="94" grpId="19"/>
-      <p:bldP build="whole" bldLvl="1" animBg="1" rev="0" advAuto="0" spid="86" grpId="4"/>
-      <p:bldP build="whole" bldLvl="1" animBg="1" rev="0" advAuto="0" spid="99" grpId="37"/>
-      <p:bldP build="whole" bldLvl="1" animBg="1" rev="0" advAuto="0" spid="108" grpId="5"/>
-      <p:bldP build="whole" bldLvl="1" animBg="1" rev="0" advAuto="0" spid="112" grpId="25"/>
     </p:bldLst>
   </p:timing>
 </p:sld>
@@ -21577,11 +21580,11 @@
       </p:par>
     </p:tnLst>
     <p:bldLst>
-      <p:bldP build="whole" bldLvl="1" animBg="1" rev="0" advAuto="0" spid="164" grpId="4"/>
-      <p:bldP build="whole" bldLvl="1" animBg="1" rev="0" advAuto="0" spid="156" grpId="1"/>
-      <p:bldP build="whole" bldLvl="1" animBg="1" rev="0" advAuto="0" spid="163" grpId="3"/>
       <p:bldP build="whole" bldLvl="1" animBg="1" rev="0" advAuto="0" spid="162" grpId="2"/>
       <p:bldP build="whole" bldLvl="1" animBg="1" rev="0" advAuto="0" spid="165" grpId="5"/>
+      <p:bldP build="whole" bldLvl="1" animBg="1" rev="0" advAuto="0" spid="163" grpId="3"/>
+      <p:bldP build="whole" bldLvl="1" animBg="1" rev="0" advAuto="0" spid="156" grpId="1"/>
+      <p:bldP build="whole" bldLvl="1" animBg="1" rev="0" advAuto="0" spid="164" grpId="4"/>
     </p:bldLst>
   </p:timing>
 </p:sld>
@@ -29965,16 +29968,16 @@
       </p:par>
     </p:tnLst>
     <p:bldLst>
+      <p:bldP build="whole" bldLvl="1" animBg="1" rev="0" advAuto="0" spid="194" grpId="7"/>
+      <p:bldP build="whole" bldLvl="1" animBg="1" rev="0" advAuto="0" spid="189" grpId="2"/>
       <p:bldP build="whole" bldLvl="1" animBg="1" rev="0" advAuto="0" spid="191" grpId="4"/>
+      <p:bldP build="whole" bldLvl="1" animBg="1" rev="0" advAuto="0" spid="192" grpId="5"/>
+      <p:bldP build="whole" bldLvl="1" animBg="1" rev="0" advAuto="0" spid="193" grpId="6"/>
+      <p:bldP build="whole" bldLvl="1" animBg="1" rev="0" advAuto="0" spid="195" grpId="8"/>
+      <p:bldP build="whole" bldLvl="1" animBg="1" rev="0" advAuto="0" spid="188" grpId="1"/>
+      <p:bldP build="whole" bldLvl="1" animBg="1" rev="0" advAuto="0" spid="190" grpId="3"/>
       <p:bldP build="whole" bldLvl="1" animBg="1" rev="0" advAuto="0" spid="196" grpId="9"/>
-      <p:bldP build="whole" bldLvl="1" animBg="1" rev="0" advAuto="0" spid="189" grpId="2"/>
-      <p:bldP build="whole" bldLvl="1" animBg="1" rev="0" advAuto="0" spid="188" grpId="1"/>
-      <p:bldP build="whole" bldLvl="1" animBg="1" rev="0" advAuto="0" spid="194" grpId="7"/>
-      <p:bldP build="whole" bldLvl="1" animBg="1" rev="0" advAuto="0" spid="192" grpId="5"/>
-      <p:bldP build="whole" bldLvl="1" animBg="1" rev="0" advAuto="0" spid="190" grpId="3"/>
       <p:bldP build="whole" bldLvl="1" animBg="1" rev="0" advAuto="0" spid="171" grpId="10"/>
-      <p:bldP build="whole" bldLvl="1" animBg="1" rev="0" advAuto="0" spid="195" grpId="8"/>
-      <p:bldP build="whole" bldLvl="1" animBg="1" rev="0" advAuto="0" spid="193" grpId="6"/>
     </p:bldLst>
   </p:timing>
 </p:sld>
@@ -36571,38 +36574,38 @@
       </p:par>
     </p:tnLst>
     <p:bldLst>
+      <p:bldP build="whole" bldLvl="1" animBg="1" rev="0" advAuto="0" spid="226" grpId="26"/>
+      <p:bldP build="whole" bldLvl="1" animBg="1" rev="0" advAuto="0" spid="228" grpId="32"/>
+      <p:bldP build="whole" bldLvl="1" animBg="1" rev="0" advAuto="0" spid="224" grpId="16"/>
+      <p:bldP build="whole" bldLvl="1" animBg="1" rev="0" advAuto="0" spid="241" grpId="20"/>
+      <p:bldP build="whole" bldLvl="1" animBg="1" rev="0" advAuto="0" spid="251" grpId="28"/>
+      <p:bldP build="whole" bldLvl="1" animBg="1" rev="0" advAuto="0" spid="247" grpId="23"/>
+      <p:bldP build="whole" bldLvl="1" animBg="1" rev="0" advAuto="0" spid="237" grpId="12"/>
+      <p:bldP build="whole" bldLvl="1" animBg="1" rev="0" advAuto="0" spid="240" grpId="17"/>
+      <p:bldP build="whole" bldLvl="1" animBg="1" rev="0" advAuto="0" spid="222" grpId="6"/>
+      <p:bldP build="whole" bldLvl="1" animBg="1" rev="0" advAuto="0" spid="225" grpId="21"/>
+      <p:bldP build="whole" bldLvl="1" animBg="1" rev="0" advAuto="0" spid="221" grpId="2"/>
+      <p:bldP build="whole" bldLvl="1" animBg="1" rev="0" advAuto="0" spid="244" grpId="22"/>
+      <p:bldP build="whole" bldLvl="1" animBg="1" rev="0" advAuto="0" spid="246" grpId="25"/>
+      <p:bldP build="whole" bldLvl="1" animBg="1" rev="0" advAuto="0" spid="223" grpId="11"/>
+      <p:bldP build="whole" bldLvl="1" animBg="1" rev="0" advAuto="0" spid="235" grpId="10"/>
+      <p:bldP build="whole" bldLvl="1" animBg="1" rev="0" advAuto="0" spid="230" grpId="5"/>
+      <p:bldP build="whole" bldLvl="1" animBg="1" rev="0" advAuto="0" spid="232" grpId="9"/>
+      <p:bldP build="whole" bldLvl="1" animBg="1" rev="0" advAuto="0" spid="248" grpId="27"/>
+      <p:bldP build="whole" bldLvl="1" animBg="1" rev="0" advAuto="0" spid="249" grpId="29"/>
+      <p:bldP build="whole" bldLvl="1" animBg="1" rev="0" advAuto="0" spid="245" grpId="24"/>
+      <p:bldP build="whole" bldLvl="1" animBg="1" rev="0" advAuto="0" spid="250" grpId="30"/>
+      <p:bldP build="whole" bldLvl="1" animBg="1" rev="0" advAuto="0" spid="236" grpId="15"/>
+      <p:bldP build="whole" bldLvl="1" animBg="1" rev="0" advAuto="0" spid="227" grpId="31"/>
+      <p:bldP build="whole" bldLvl="1" animBg="1" rev="0" advAuto="0" spid="243" grpId="19"/>
+      <p:bldP build="whole" bldLvl="1" animBg="1" rev="0" advAuto="0" spid="229" grpId="4"/>
+      <p:bldP build="whole" bldLvl="1" animBg="1" rev="0" advAuto="0" spid="233" grpId="8"/>
       <p:bldP build="whole" bldLvl="1" animBg="1" rev="0" advAuto="0" spid="220" grpId="1"/>
-      <p:bldP build="whole" bldLvl="1" animBg="1" rev="0" advAuto="0" spid="232" grpId="9"/>
+      <p:bldP build="whole" bldLvl="1" animBg="1" rev="0" advAuto="0" spid="239" grpId="14"/>
+      <p:bldP build="whole" bldLvl="1" animBg="1" rev="0" advAuto="0" spid="231" grpId="3"/>
       <p:bldP build="whole" bldLvl="1" animBg="1" rev="0" advAuto="0" spid="238" grpId="13"/>
-      <p:bldP build="whole" bldLvl="1" animBg="1" rev="0" advAuto="0" spid="223" grpId="11"/>
-      <p:bldP build="whole" bldLvl="1" animBg="1" rev="0" advAuto="0" spid="246" grpId="25"/>
-      <p:bldP build="whole" bldLvl="1" animBg="1" rev="0" advAuto="0" spid="230" grpId="5"/>
-      <p:bldP build="whole" bldLvl="1" animBg="1" rev="0" advAuto="0" spid="237" grpId="12"/>
-      <p:bldP build="whole" bldLvl="1" animBg="1" rev="0" advAuto="0" spid="239" grpId="14"/>
-      <p:bldP build="whole" bldLvl="1" animBg="1" rev="0" advAuto="0" spid="241" grpId="20"/>
-      <p:bldP build="whole" bldLvl="1" animBg="1" rev="0" advAuto="0" spid="244" grpId="22"/>
-      <p:bldP build="whole" bldLvl="1" animBg="1" rev="0" advAuto="0" spid="240" grpId="17"/>
-      <p:bldP build="whole" bldLvl="1" animBg="1" rev="0" advAuto="0" spid="249" grpId="29"/>
-      <p:bldP build="whole" bldLvl="1" animBg="1" rev="0" advAuto="0" spid="225" grpId="21"/>
-      <p:bldP build="whole" bldLvl="1" animBg="1" rev="0" advAuto="0" spid="229" grpId="4"/>
-      <p:bldP build="whole" bldLvl="1" animBg="1" rev="0" advAuto="0" spid="227" grpId="31"/>
-      <p:bldP build="whole" bldLvl="1" animBg="1" rev="0" advAuto="0" spid="228" grpId="32"/>
-      <p:bldP build="whole" bldLvl="1" animBg="1" rev="0" advAuto="0" spid="251" grpId="28"/>
-      <p:bldP build="whole" bldLvl="1" animBg="1" rev="0" advAuto="0" spid="248" grpId="27"/>
-      <p:bldP build="whole" bldLvl="1" animBg="1" rev="0" advAuto="0" spid="224" grpId="16"/>
-      <p:bldP build="whole" bldLvl="1" animBg="1" rev="0" advAuto="0" spid="247" grpId="23"/>
-      <p:bldP build="whole" bldLvl="1" animBg="1" rev="0" advAuto="0" spid="233" grpId="8"/>
-      <p:bldP build="whole" bldLvl="1" animBg="1" rev="0" advAuto="0" spid="235" grpId="10"/>
-      <p:bldP build="whole" bldLvl="1" animBg="1" rev="0" advAuto="0" spid="250" grpId="30"/>
-      <p:bldP build="whole" bldLvl="1" animBg="1" rev="0" advAuto="0" spid="231" grpId="3"/>
-      <p:bldP build="whole" bldLvl="1" animBg="1" rev="0" advAuto="0" spid="245" grpId="24"/>
       <p:bldP build="whole" bldLvl="1" animBg="1" rev="0" advAuto="0" spid="242" grpId="18"/>
-      <p:bldP build="whole" bldLvl="1" animBg="1" rev="0" advAuto="0" spid="243" grpId="19"/>
-      <p:bldP build="whole" bldLvl="1" animBg="1" rev="0" advAuto="0" spid="226" grpId="26"/>
       <p:bldP build="whole" bldLvl="1" animBg="1" rev="0" advAuto="0" spid="234" grpId="7"/>
-      <p:bldP build="whole" bldLvl="1" animBg="1" rev="0" advAuto="0" spid="222" grpId="6"/>
-      <p:bldP build="whole" bldLvl="1" animBg="1" rev="0" advAuto="0" spid="221" grpId="2"/>
-      <p:bldP build="whole" bldLvl="1" animBg="1" rev="0" advAuto="0" spid="236" grpId="15"/>
     </p:bldLst>
   </p:timing>
 </p:sld>
@@ -39386,26 +39389,26 @@
       </p:par>
     </p:tnLst>
     <p:bldLst>
-      <p:bldP build="whole" bldLvl="1" animBg="1" rev="0" advAuto="0" spid="290" grpId="4"/>
-      <p:bldP build="p" bldLvl="5" animBg="1" rev="0" advAuto="0" spid="282" grpId="9"/>
-      <p:bldP build="whole" bldLvl="1" animBg="1" rev="0" advAuto="0" spid="275" grpId="17"/>
-      <p:bldP build="whole" bldLvl="1" animBg="1" rev="0" advAuto="0" spid="277" grpId="16"/>
-      <p:bldP build="whole" bldLvl="1" animBg="1" rev="0" advAuto="0" spid="276" grpId="7"/>
-      <p:bldP build="whole" bldLvl="1" animBg="1" rev="0" advAuto="0" spid="276" grpId="14"/>
-      <p:bldP build="whole" bldLvl="1" animBg="1" rev="0" advAuto="0" spid="281" grpId="6"/>
-      <p:bldP build="p" bldLvl="5" animBg="1" rev="0" advAuto="0" spid="283" grpId="12"/>
       <p:bldP build="p" bldLvl="5" animBg="1" rev="0" advAuto="0" spid="286" grpId="19"/>
       <p:bldP build="whole" bldLvl="1" animBg="1" rev="0" advAuto="0" spid="285" grpId="18"/>
+      <p:bldP build="p" bldLvl="5" animBg="1" rev="0" advAuto="0" spid="287" grpId="20"/>
+      <p:bldP build="whole" bldLvl="1" animBg="1" rev="0" advAuto="0" spid="288" grpId="3"/>
+      <p:bldP build="p" bldLvl="5" animBg="1" rev="0" advAuto="0" spid="283" grpId="12"/>
+      <p:bldP build="whole" bldLvl="1" animBg="1" rev="0" advAuto="0" spid="278" grpId="15"/>
       <p:bldP build="whole" bldLvl="1" animBg="1" rev="0" advAuto="0" spid="284" grpId="11"/>
+      <p:bldP build="whole" bldLvl="1" animBg="1" rev="0" advAuto="0" spid="276" grpId="7"/>
       <p:bldP build="whole" bldLvl="1" animBg="1" rev="0" advAuto="0" spid="284" grpId="13"/>
-      <p:bldP build="p" bldLvl="5" animBg="1" rev="0" advAuto="0" spid="287" grpId="20"/>
-      <p:bldP build="whole" bldLvl="1" animBg="1" rev="0" advAuto="0" spid="278" grpId="15"/>
+      <p:bldP build="whole" bldLvl="1" animBg="1" rev="0" advAuto="0" spid="290" grpId="4"/>
+      <p:bldP build="whole" bldLvl="1" animBg="1" rev="0" advAuto="0" spid="289" grpId="2"/>
+      <p:bldP build="p" bldLvl="5" animBg="1" rev="0" advAuto="0" spid="282" grpId="9"/>
       <p:bldP build="whole" bldLvl="1" animBg="1" rev="0" advAuto="0" spid="280" grpId="5"/>
+      <p:bldP build="whole" bldLvl="1" animBg="1" rev="0" advAuto="0" spid="276" grpId="14"/>
+      <p:bldP build="whole" bldLvl="1" animBg="1" rev="0" advAuto="0" spid="277" grpId="16"/>
+      <p:bldP build="whole" bldLvl="1" animBg="1" rev="0" advAuto="0" spid="275" grpId="17"/>
+      <p:bldP build="whole" bldLvl="1" animBg="1" rev="0" advAuto="0" spid="279" grpId="8"/>
       <p:bldP build="p" bldLvl="5" animBg="1" rev="0" advAuto="0" spid="267" grpId="1"/>
-      <p:bldP build="whole" bldLvl="1" animBg="1" rev="0" advAuto="0" spid="289" grpId="2"/>
-      <p:bldP build="whole" bldLvl="1" animBg="1" rev="0" advAuto="0" spid="279" grpId="8"/>
       <p:bldP build="whole" bldLvl="1" animBg="1" rev="0" advAuto="0" spid="279" grpId="10"/>
-      <p:bldP build="whole" bldLvl="1" animBg="1" rev="0" advAuto="0" spid="288" grpId="3"/>
+      <p:bldP build="whole" bldLvl="1" animBg="1" rev="0" advAuto="0" spid="281" grpId="6"/>
     </p:bldLst>
   </p:timing>
 </p:sld>

</xml_diff>

<commit_message>
typo error, changed footer to reflect Module 5: Backtracking, Branch-bound, NP-Complete
</commit_message>
<xml_diff>
--- a/Slides-RPR/2019-H1-DAA-L41-BackTrack-Intro.pptx
+++ b/Slides-RPR/2019-H1-DAA-L41-BackTrack-Intro.pptx
@@ -1112,47 +1112,7 @@
       </p:sp>
       <p:sp>
         <p:nvSpPr>
-          <p:cNvPr id="5" name="DAA/Dynamic Programming"/>
-          <p:cNvSpPr txBox="1"/>
-          <p:nvPr/>
-        </p:nvSpPr>
-        <p:spPr>
-          <a:xfrm>
-            <a:off x="423212" y="6963885"/>
-            <a:ext cx="3769679" cy="431552"/>
-          </a:xfrm>
-          <a:prstGeom prst="rect">
-            <a:avLst/>
-          </a:prstGeom>
-          <a:ln w="12700">
-            <a:miter lim="400000"/>
-          </a:ln>
-          <a:extLst>
-            <a:ext uri="{C572A759-6A51-4108-AA02-DFA0A04FC94B}">
-              <ma14:wrappingTextBoxFlag xmlns:ma14="http://schemas.microsoft.com/office/mac/drawingml/2011/main" val="1"/>
-            </a:ext>
-          </a:extLst>
-        </p:spPr>
-        <p:txBody>
-          <a:bodyPr wrap="none" lIns="50800" tIns="50800" rIns="50800" bIns="50800" anchor="ctr">
-            <a:spAutoFit/>
-          </a:bodyPr>
-          <a:lstStyle>
-            <a:lvl1pPr>
-              <a:defRPr sz="2400"/>
-            </a:lvl1pPr>
-          </a:lstStyle>
-          <a:p>
-            <a:pPr/>
-            <a:r>
-              <a:t>DAA/Dynamic Programming</a:t>
-            </a:r>
-          </a:p>
-        </p:txBody>
-      </p:sp>
-      <p:sp>
-        <p:nvSpPr>
-          <p:cNvPr id="6" name="RPR/"/>
+          <p:cNvPr id="5" name="RPR/"/>
           <p:cNvSpPr txBox="1"/>
           <p:nvPr/>
         </p:nvSpPr>
@@ -1186,6 +1146,46 @@
             <a:pPr/>
             <a:r>
               <a:t>RPR/</a:t>
+            </a:r>
+          </a:p>
+        </p:txBody>
+      </p:sp>
+      <p:sp>
+        <p:nvSpPr>
+          <p:cNvPr id="6" name="DAA/Backtracking, Branch&amp;Bound, NP-Complete"/>
+          <p:cNvSpPr txBox="1"/>
+          <p:nvPr/>
+        </p:nvSpPr>
+        <p:spPr>
+          <a:xfrm>
+            <a:off x="215739" y="6963885"/>
+            <a:ext cx="6436083" cy="431552"/>
+          </a:xfrm>
+          <a:prstGeom prst="rect">
+            <a:avLst/>
+          </a:prstGeom>
+          <a:ln w="12700">
+            <a:miter lim="400000"/>
+          </a:ln>
+          <a:extLst>
+            <a:ext uri="{C572A759-6A51-4108-AA02-DFA0A04FC94B}">
+              <ma14:wrappingTextBoxFlag xmlns:ma14="http://schemas.microsoft.com/office/mac/drawingml/2011/main" val="1"/>
+            </a:ext>
+          </a:extLst>
+        </p:spPr>
+        <p:txBody>
+          <a:bodyPr wrap="none" lIns="50800" tIns="50800" rIns="50800" bIns="50800" anchor="ctr">
+            <a:spAutoFit/>
+          </a:bodyPr>
+          <a:lstStyle>
+            <a:lvl1pPr>
+              <a:defRPr sz="2400"/>
+            </a:lvl1pPr>
+          </a:lstStyle>
+          <a:p>
+            <a:pPr/>
+            <a:r>
+              <a:t>DAA/Backtracking, Branch&amp;Bound, NP-Complete</a:t>
             </a:r>
           </a:p>
         </p:txBody>
@@ -2226,47 +2226,7 @@
       </p:sp>
       <p:sp>
         <p:nvSpPr>
-          <p:cNvPr id="43" name="DAA/Dynamic Programming"/>
-          <p:cNvSpPr txBox="1"/>
-          <p:nvPr/>
-        </p:nvSpPr>
-        <p:spPr>
-          <a:xfrm>
-            <a:off x="423212" y="6963885"/>
-            <a:ext cx="3769679" cy="431552"/>
-          </a:xfrm>
-          <a:prstGeom prst="rect">
-            <a:avLst/>
-          </a:prstGeom>
-          <a:ln w="12700">
-            <a:miter lim="400000"/>
-          </a:ln>
-          <a:extLst>
-            <a:ext uri="{C572A759-6A51-4108-AA02-DFA0A04FC94B}">
-              <ma14:wrappingTextBoxFlag xmlns:ma14="http://schemas.microsoft.com/office/mac/drawingml/2011/main" val="1"/>
-            </a:ext>
-          </a:extLst>
-        </p:spPr>
-        <p:txBody>
-          <a:bodyPr wrap="none" lIns="50800" tIns="50800" rIns="50800" bIns="50800" anchor="ctr">
-            <a:spAutoFit/>
-          </a:bodyPr>
-          <a:lstStyle>
-            <a:lvl1pPr>
-              <a:defRPr sz="2400"/>
-            </a:lvl1pPr>
-          </a:lstStyle>
-          <a:p>
-            <a:pPr/>
-            <a:r>
-              <a:t>DAA/Dynamic Programming</a:t>
-            </a:r>
-          </a:p>
-        </p:txBody>
-      </p:sp>
-      <p:sp>
-        <p:nvSpPr>
-          <p:cNvPr id="44" name="RPR/"/>
+          <p:cNvPr id="43" name="RPR/"/>
           <p:cNvSpPr txBox="1"/>
           <p:nvPr/>
         </p:nvSpPr>
@@ -2306,7 +2266,7 @@
       </p:sp>
       <p:sp>
         <p:nvSpPr>
-          <p:cNvPr id="45" name="Dr. Ram P Rustagi…"/>
+          <p:cNvPr id="44" name="Dr. Ram P Rustagi…"/>
           <p:cNvSpPr txBox="1"/>
           <p:nvPr>
             <p:ph type="body" sz="quarter" idx="1"/>
@@ -2451,6 +2411,46 @@
           </a:p>
         </p:txBody>
       </p:sp>
+      <p:sp>
+        <p:nvSpPr>
+          <p:cNvPr id="45" name="DAA/Backtracking, Branch&amp;Bound, NP-Complete"/>
+          <p:cNvSpPr txBox="1"/>
+          <p:nvPr/>
+        </p:nvSpPr>
+        <p:spPr>
+          <a:xfrm>
+            <a:off x="215739" y="6963885"/>
+            <a:ext cx="6436083" cy="431552"/>
+          </a:xfrm>
+          <a:prstGeom prst="rect">
+            <a:avLst/>
+          </a:prstGeom>
+          <a:ln w="12700">
+            <a:miter lim="400000"/>
+          </a:ln>
+          <a:extLst>
+            <a:ext uri="{C572A759-6A51-4108-AA02-DFA0A04FC94B}">
+              <ma14:wrappingTextBoxFlag xmlns:ma14="http://schemas.microsoft.com/office/mac/drawingml/2011/main" val="1"/>
+            </a:ext>
+          </a:extLst>
+        </p:spPr>
+        <p:txBody>
+          <a:bodyPr wrap="none" lIns="50800" tIns="50800" rIns="50800" bIns="50800" anchor="ctr">
+            <a:spAutoFit/>
+          </a:bodyPr>
+          <a:lstStyle>
+            <a:lvl1pPr>
+              <a:defRPr sz="2400"/>
+            </a:lvl1pPr>
+          </a:lstStyle>
+          <a:p>
+            <a:pPr/>
+            <a:r>
+              <a:t>DAA/Backtracking, Branch&amp;Bound, NP-Complete</a:t>
+            </a:r>
+          </a:p>
+        </p:txBody>
+      </p:sp>
     </p:spTree>
   </p:cSld>
   <p:clrMapOvr>
@@ -2771,47 +2771,7 @@
       </p:sp>
       <p:sp>
         <p:nvSpPr>
-          <p:cNvPr id="301" name="DAA/Dynamic Programming"/>
-          <p:cNvSpPr txBox="1"/>
-          <p:nvPr/>
-        </p:nvSpPr>
-        <p:spPr>
-          <a:xfrm>
-            <a:off x="423212" y="6963885"/>
-            <a:ext cx="3769679" cy="431552"/>
-          </a:xfrm>
-          <a:prstGeom prst="rect">
-            <a:avLst/>
-          </a:prstGeom>
-          <a:ln w="12700">
-            <a:miter lim="400000"/>
-          </a:ln>
-          <a:extLst>
-            <a:ext uri="{C572A759-6A51-4108-AA02-DFA0A04FC94B}">
-              <ma14:wrappingTextBoxFlag xmlns:ma14="http://schemas.microsoft.com/office/mac/drawingml/2011/main" val="1"/>
-            </a:ext>
-          </a:extLst>
-        </p:spPr>
-        <p:txBody>
-          <a:bodyPr wrap="none" lIns="50800" tIns="50800" rIns="50800" bIns="50800" anchor="ctr">
-            <a:spAutoFit/>
-          </a:bodyPr>
-          <a:lstStyle>
-            <a:lvl1pPr>
-              <a:defRPr sz="2400"/>
-            </a:lvl1pPr>
-          </a:lstStyle>
-          <a:p>
-            <a:pPr/>
-            <a:r>
-              <a:t>DAA/Dynamic Programming</a:t>
-            </a:r>
-          </a:p>
-        </p:txBody>
-      </p:sp>
-      <p:sp>
-        <p:nvSpPr>
-          <p:cNvPr id="302" name="RPR/"/>
+          <p:cNvPr id="301" name="RPR/"/>
           <p:cNvSpPr txBox="1"/>
           <p:nvPr/>
         </p:nvSpPr>
@@ -2845,6 +2805,46 @@
             <a:pPr/>
             <a:r>
               <a:t>RPR/</a:t>
+            </a:r>
+          </a:p>
+        </p:txBody>
+      </p:sp>
+      <p:sp>
+        <p:nvSpPr>
+          <p:cNvPr id="302" name="DAA/Backtracking, Branch&amp;Bound, NP-Complete"/>
+          <p:cNvSpPr txBox="1"/>
+          <p:nvPr/>
+        </p:nvSpPr>
+        <p:spPr>
+          <a:xfrm>
+            <a:off x="215739" y="6963885"/>
+            <a:ext cx="6436083" cy="431552"/>
+          </a:xfrm>
+          <a:prstGeom prst="rect">
+            <a:avLst/>
+          </a:prstGeom>
+          <a:ln w="12700">
+            <a:miter lim="400000"/>
+          </a:ln>
+          <a:extLst>
+            <a:ext uri="{C572A759-6A51-4108-AA02-DFA0A04FC94B}">
+              <ma14:wrappingTextBoxFlag xmlns:ma14="http://schemas.microsoft.com/office/mac/drawingml/2011/main" val="1"/>
+            </a:ext>
+          </a:extLst>
+        </p:spPr>
+        <p:txBody>
+          <a:bodyPr wrap="none" lIns="50800" tIns="50800" rIns="50800" bIns="50800" anchor="ctr">
+            <a:spAutoFit/>
+          </a:bodyPr>
+          <a:lstStyle>
+            <a:lvl1pPr>
+              <a:defRPr sz="2400"/>
+            </a:lvl1pPr>
+          </a:lstStyle>
+          <a:p>
+            <a:pPr/>
+            <a:r>
+              <a:t>DAA/Backtracking, Branch&amp;Bound, NP-Complete</a:t>
             </a:r>
           </a:p>
         </p:txBody>
@@ -3733,47 +3733,7 @@
       </p:sp>
       <p:sp>
         <p:nvSpPr>
-          <p:cNvPr id="307" name="DAA/Dynamic Programming"/>
-          <p:cNvSpPr txBox="1"/>
-          <p:nvPr/>
-        </p:nvSpPr>
-        <p:spPr>
-          <a:xfrm>
-            <a:off x="423212" y="6963885"/>
-            <a:ext cx="3769679" cy="431552"/>
-          </a:xfrm>
-          <a:prstGeom prst="rect">
-            <a:avLst/>
-          </a:prstGeom>
-          <a:ln w="12700">
-            <a:miter lim="400000"/>
-          </a:ln>
-          <a:extLst>
-            <a:ext uri="{C572A759-6A51-4108-AA02-DFA0A04FC94B}">
-              <ma14:wrappingTextBoxFlag xmlns:ma14="http://schemas.microsoft.com/office/mac/drawingml/2011/main" val="1"/>
-            </a:ext>
-          </a:extLst>
-        </p:spPr>
-        <p:txBody>
-          <a:bodyPr wrap="none" lIns="50800" tIns="50800" rIns="50800" bIns="50800" anchor="ctr">
-            <a:spAutoFit/>
-          </a:bodyPr>
-          <a:lstStyle>
-            <a:lvl1pPr>
-              <a:defRPr sz="2400"/>
-            </a:lvl1pPr>
-          </a:lstStyle>
-          <a:p>
-            <a:pPr/>
-            <a:r>
-              <a:t>DAA/Dynamic Programming</a:t>
-            </a:r>
-          </a:p>
-        </p:txBody>
-      </p:sp>
-      <p:sp>
-        <p:nvSpPr>
-          <p:cNvPr id="308" name="RPR/"/>
+          <p:cNvPr id="307" name="RPR/"/>
           <p:cNvSpPr txBox="1"/>
           <p:nvPr/>
         </p:nvSpPr>
@@ -3807,6 +3767,46 @@
             <a:pPr/>
             <a:r>
               <a:t>RPR/</a:t>
+            </a:r>
+          </a:p>
+        </p:txBody>
+      </p:sp>
+      <p:sp>
+        <p:nvSpPr>
+          <p:cNvPr id="308" name="DAA/Backtracking, Branch&amp;Bound, NP-Complete"/>
+          <p:cNvSpPr txBox="1"/>
+          <p:nvPr/>
+        </p:nvSpPr>
+        <p:spPr>
+          <a:xfrm>
+            <a:off x="215739" y="6963885"/>
+            <a:ext cx="6436083" cy="431552"/>
+          </a:xfrm>
+          <a:prstGeom prst="rect">
+            <a:avLst/>
+          </a:prstGeom>
+          <a:ln w="12700">
+            <a:miter lim="400000"/>
+          </a:ln>
+          <a:extLst>
+            <a:ext uri="{C572A759-6A51-4108-AA02-DFA0A04FC94B}">
+              <ma14:wrappingTextBoxFlag xmlns:ma14="http://schemas.microsoft.com/office/mac/drawingml/2011/main" val="1"/>
+            </a:ext>
+          </a:extLst>
+        </p:spPr>
+        <p:txBody>
+          <a:bodyPr wrap="none" lIns="50800" tIns="50800" rIns="50800" bIns="50800" anchor="ctr">
+            <a:spAutoFit/>
+          </a:bodyPr>
+          <a:lstStyle>
+            <a:lvl1pPr>
+              <a:defRPr sz="2400"/>
+            </a:lvl1pPr>
+          </a:lstStyle>
+          <a:p>
+            <a:pPr/>
+            <a:r>
+              <a:t>DAA/Backtracking, Branch&amp;Bound, NP-Complete</a:t>
             </a:r>
           </a:p>
         </p:txBody>
@@ -5026,47 +5026,7 @@
       </p:sp>
       <p:sp>
         <p:nvSpPr>
-          <p:cNvPr id="313" name="DAA/Dynamic Programming"/>
-          <p:cNvSpPr txBox="1"/>
-          <p:nvPr/>
-        </p:nvSpPr>
-        <p:spPr>
-          <a:xfrm>
-            <a:off x="423212" y="6963885"/>
-            <a:ext cx="3769679" cy="431552"/>
-          </a:xfrm>
-          <a:prstGeom prst="rect">
-            <a:avLst/>
-          </a:prstGeom>
-          <a:ln w="12700">
-            <a:miter lim="400000"/>
-          </a:ln>
-          <a:extLst>
-            <a:ext uri="{C572A759-6A51-4108-AA02-DFA0A04FC94B}">
-              <ma14:wrappingTextBoxFlag xmlns:ma14="http://schemas.microsoft.com/office/mac/drawingml/2011/main" val="1"/>
-            </a:ext>
-          </a:extLst>
-        </p:spPr>
-        <p:txBody>
-          <a:bodyPr wrap="none" lIns="50800" tIns="50800" rIns="50800" bIns="50800" anchor="ctr">
-            <a:spAutoFit/>
-          </a:bodyPr>
-          <a:lstStyle>
-            <a:lvl1pPr>
-              <a:defRPr sz="2400"/>
-            </a:lvl1pPr>
-          </a:lstStyle>
-          <a:p>
-            <a:pPr/>
-            <a:r>
-              <a:t>DAA/Dynamic Programming</a:t>
-            </a:r>
-          </a:p>
-        </p:txBody>
-      </p:sp>
-      <p:sp>
-        <p:nvSpPr>
-          <p:cNvPr id="314" name="RPR/"/>
+          <p:cNvPr id="313" name="RPR/"/>
           <p:cNvSpPr txBox="1"/>
           <p:nvPr/>
         </p:nvSpPr>
@@ -5100,6 +5060,46 @@
             <a:pPr/>
             <a:r>
               <a:t>RPR/</a:t>
+            </a:r>
+          </a:p>
+        </p:txBody>
+      </p:sp>
+      <p:sp>
+        <p:nvSpPr>
+          <p:cNvPr id="314" name="DAA/Backtracking, Branch&amp;Bound, NP-Complete"/>
+          <p:cNvSpPr txBox="1"/>
+          <p:nvPr/>
+        </p:nvSpPr>
+        <p:spPr>
+          <a:xfrm>
+            <a:off x="215739" y="6963885"/>
+            <a:ext cx="6436083" cy="431552"/>
+          </a:xfrm>
+          <a:prstGeom prst="rect">
+            <a:avLst/>
+          </a:prstGeom>
+          <a:ln w="12700">
+            <a:miter lim="400000"/>
+          </a:ln>
+          <a:extLst>
+            <a:ext uri="{C572A759-6A51-4108-AA02-DFA0A04FC94B}">
+              <ma14:wrappingTextBoxFlag xmlns:ma14="http://schemas.microsoft.com/office/mac/drawingml/2011/main" val="1"/>
+            </a:ext>
+          </a:extLst>
+        </p:spPr>
+        <p:txBody>
+          <a:bodyPr wrap="none" lIns="50800" tIns="50800" rIns="50800" bIns="50800" anchor="ctr">
+            <a:spAutoFit/>
+          </a:bodyPr>
+          <a:lstStyle>
+            <a:lvl1pPr>
+              <a:defRPr sz="2400"/>
+            </a:lvl1pPr>
+          </a:lstStyle>
+          <a:p>
+            <a:pPr/>
+            <a:r>
+              <a:t>DAA/Backtracking, Branch&amp;Bound, NP-Complete</a:t>
             </a:r>
           </a:p>
         </p:txBody>
@@ -6309,47 +6309,7 @@
       </p:sp>
       <p:sp>
         <p:nvSpPr>
-          <p:cNvPr id="319" name="DAA/Dynamic Programming"/>
-          <p:cNvSpPr txBox="1"/>
-          <p:nvPr/>
-        </p:nvSpPr>
-        <p:spPr>
-          <a:xfrm>
-            <a:off x="423212" y="6963885"/>
-            <a:ext cx="3769679" cy="431552"/>
-          </a:xfrm>
-          <a:prstGeom prst="rect">
-            <a:avLst/>
-          </a:prstGeom>
-          <a:ln w="12700">
-            <a:miter lim="400000"/>
-          </a:ln>
-          <a:extLst>
-            <a:ext uri="{C572A759-6A51-4108-AA02-DFA0A04FC94B}">
-              <ma14:wrappingTextBoxFlag xmlns:ma14="http://schemas.microsoft.com/office/mac/drawingml/2011/main" val="1"/>
-            </a:ext>
-          </a:extLst>
-        </p:spPr>
-        <p:txBody>
-          <a:bodyPr wrap="none" lIns="50800" tIns="50800" rIns="50800" bIns="50800" anchor="ctr">
-            <a:spAutoFit/>
-          </a:bodyPr>
-          <a:lstStyle>
-            <a:lvl1pPr>
-              <a:defRPr sz="2400"/>
-            </a:lvl1pPr>
-          </a:lstStyle>
-          <a:p>
-            <a:pPr/>
-            <a:r>
-              <a:t>DAA/Dynamic Programming</a:t>
-            </a:r>
-          </a:p>
-        </p:txBody>
-      </p:sp>
-      <p:sp>
-        <p:nvSpPr>
-          <p:cNvPr id="320" name="RPR/"/>
+          <p:cNvPr id="319" name="RPR/"/>
           <p:cNvSpPr txBox="1"/>
           <p:nvPr/>
         </p:nvSpPr>
@@ -6383,6 +6343,46 @@
             <a:pPr/>
             <a:r>
               <a:t>RPR/</a:t>
+            </a:r>
+          </a:p>
+        </p:txBody>
+      </p:sp>
+      <p:sp>
+        <p:nvSpPr>
+          <p:cNvPr id="320" name="DAA/Backtracking, Branch&amp;Bound, NP-Complete"/>
+          <p:cNvSpPr txBox="1"/>
+          <p:nvPr/>
+        </p:nvSpPr>
+        <p:spPr>
+          <a:xfrm>
+            <a:off x="215739" y="6963885"/>
+            <a:ext cx="6436083" cy="431552"/>
+          </a:xfrm>
+          <a:prstGeom prst="rect">
+            <a:avLst/>
+          </a:prstGeom>
+          <a:ln w="12700">
+            <a:miter lim="400000"/>
+          </a:ln>
+          <a:extLst>
+            <a:ext uri="{C572A759-6A51-4108-AA02-DFA0A04FC94B}">
+              <ma14:wrappingTextBoxFlag xmlns:ma14="http://schemas.microsoft.com/office/mac/drawingml/2011/main" val="1"/>
+            </a:ext>
+          </a:extLst>
+        </p:spPr>
+        <p:txBody>
+          <a:bodyPr wrap="none" lIns="50800" tIns="50800" rIns="50800" bIns="50800" anchor="ctr">
+            <a:spAutoFit/>
+          </a:bodyPr>
+          <a:lstStyle>
+            <a:lvl1pPr>
+              <a:defRPr sz="2400"/>
+            </a:lvl1pPr>
+          </a:lstStyle>
+          <a:p>
+            <a:pPr/>
+            <a:r>
+              <a:t>DAA/Backtracking, Branch&amp;Bound, NP-Complete</a:t>
             </a:r>
           </a:p>
         </p:txBody>
@@ -7538,47 +7538,7 @@
       </p:sp>
       <p:sp>
         <p:nvSpPr>
-          <p:cNvPr id="325" name="DAA/Dynamic Programming"/>
-          <p:cNvSpPr txBox="1"/>
-          <p:nvPr/>
-        </p:nvSpPr>
-        <p:spPr>
-          <a:xfrm>
-            <a:off x="423212" y="6963885"/>
-            <a:ext cx="3769679" cy="431552"/>
-          </a:xfrm>
-          <a:prstGeom prst="rect">
-            <a:avLst/>
-          </a:prstGeom>
-          <a:ln w="12700">
-            <a:miter lim="400000"/>
-          </a:ln>
-          <a:extLst>
-            <a:ext uri="{C572A759-6A51-4108-AA02-DFA0A04FC94B}">
-              <ma14:wrappingTextBoxFlag xmlns:ma14="http://schemas.microsoft.com/office/mac/drawingml/2011/main" val="1"/>
-            </a:ext>
-          </a:extLst>
-        </p:spPr>
-        <p:txBody>
-          <a:bodyPr wrap="none" lIns="50800" tIns="50800" rIns="50800" bIns="50800" anchor="ctr">
-            <a:spAutoFit/>
-          </a:bodyPr>
-          <a:lstStyle>
-            <a:lvl1pPr>
-              <a:defRPr sz="2400"/>
-            </a:lvl1pPr>
-          </a:lstStyle>
-          <a:p>
-            <a:pPr/>
-            <a:r>
-              <a:t>DAA/Dynamic Programming</a:t>
-            </a:r>
-          </a:p>
-        </p:txBody>
-      </p:sp>
-      <p:sp>
-        <p:nvSpPr>
-          <p:cNvPr id="326" name="RPR/"/>
+          <p:cNvPr id="325" name="RPR/"/>
           <p:cNvSpPr txBox="1"/>
           <p:nvPr/>
         </p:nvSpPr>
@@ -7612,6 +7572,46 @@
             <a:pPr/>
             <a:r>
               <a:t>RPR/</a:t>
+            </a:r>
+          </a:p>
+        </p:txBody>
+      </p:sp>
+      <p:sp>
+        <p:nvSpPr>
+          <p:cNvPr id="326" name="DAA/Backtracking, Branch&amp;Bound, NP-Complete"/>
+          <p:cNvSpPr txBox="1"/>
+          <p:nvPr/>
+        </p:nvSpPr>
+        <p:spPr>
+          <a:xfrm>
+            <a:off x="215739" y="6963885"/>
+            <a:ext cx="6436083" cy="431552"/>
+          </a:xfrm>
+          <a:prstGeom prst="rect">
+            <a:avLst/>
+          </a:prstGeom>
+          <a:ln w="12700">
+            <a:miter lim="400000"/>
+          </a:ln>
+          <a:extLst>
+            <a:ext uri="{C572A759-6A51-4108-AA02-DFA0A04FC94B}">
+              <ma14:wrappingTextBoxFlag xmlns:ma14="http://schemas.microsoft.com/office/mac/drawingml/2011/main" val="1"/>
+            </a:ext>
+          </a:extLst>
+        </p:spPr>
+        <p:txBody>
+          <a:bodyPr wrap="none" lIns="50800" tIns="50800" rIns="50800" bIns="50800" anchor="ctr">
+            <a:spAutoFit/>
+          </a:bodyPr>
+          <a:lstStyle>
+            <a:lvl1pPr>
+              <a:defRPr sz="2400"/>
+            </a:lvl1pPr>
+          </a:lstStyle>
+          <a:p>
+            <a:pPr/>
+            <a:r>
+              <a:t>DAA/Backtracking, Branch&amp;Bound, NP-Complete</a:t>
             </a:r>
           </a:p>
         </p:txBody>
@@ -8104,47 +8104,7 @@
       </p:sp>
       <p:sp>
         <p:nvSpPr>
-          <p:cNvPr id="331" name="DAA/Dynamic Programming"/>
-          <p:cNvSpPr txBox="1"/>
-          <p:nvPr/>
-        </p:nvSpPr>
-        <p:spPr>
-          <a:xfrm>
-            <a:off x="423212" y="6963885"/>
-            <a:ext cx="3769679" cy="431552"/>
-          </a:xfrm>
-          <a:prstGeom prst="rect">
-            <a:avLst/>
-          </a:prstGeom>
-          <a:ln w="12700">
-            <a:miter lim="400000"/>
-          </a:ln>
-          <a:extLst>
-            <a:ext uri="{C572A759-6A51-4108-AA02-DFA0A04FC94B}">
-              <ma14:wrappingTextBoxFlag xmlns:ma14="http://schemas.microsoft.com/office/mac/drawingml/2011/main" val="1"/>
-            </a:ext>
-          </a:extLst>
-        </p:spPr>
-        <p:txBody>
-          <a:bodyPr wrap="none" lIns="50800" tIns="50800" rIns="50800" bIns="50800" anchor="ctr">
-            <a:spAutoFit/>
-          </a:bodyPr>
-          <a:lstStyle>
-            <a:lvl1pPr>
-              <a:defRPr sz="2400"/>
-            </a:lvl1pPr>
-          </a:lstStyle>
-          <a:p>
-            <a:pPr/>
-            <a:r>
-              <a:t>DAA/Dynamic Programming</a:t>
-            </a:r>
-          </a:p>
-        </p:txBody>
-      </p:sp>
-      <p:sp>
-        <p:nvSpPr>
-          <p:cNvPr id="332" name="RPR/"/>
+          <p:cNvPr id="331" name="RPR/"/>
           <p:cNvSpPr txBox="1"/>
           <p:nvPr/>
         </p:nvSpPr>
@@ -8178,6 +8138,46 @@
             <a:pPr/>
             <a:r>
               <a:t>RPR/</a:t>
+            </a:r>
+          </a:p>
+        </p:txBody>
+      </p:sp>
+      <p:sp>
+        <p:nvSpPr>
+          <p:cNvPr id="332" name="DAA/Backtracking, Branch&amp;Bound, NP-Complete"/>
+          <p:cNvSpPr txBox="1"/>
+          <p:nvPr/>
+        </p:nvSpPr>
+        <p:spPr>
+          <a:xfrm>
+            <a:off x="215739" y="6963885"/>
+            <a:ext cx="6436083" cy="431552"/>
+          </a:xfrm>
+          <a:prstGeom prst="rect">
+            <a:avLst/>
+          </a:prstGeom>
+          <a:ln w="12700">
+            <a:miter lim="400000"/>
+          </a:ln>
+          <a:extLst>
+            <a:ext uri="{C572A759-6A51-4108-AA02-DFA0A04FC94B}">
+              <ma14:wrappingTextBoxFlag xmlns:ma14="http://schemas.microsoft.com/office/mac/drawingml/2011/main" val="1"/>
+            </a:ext>
+          </a:extLst>
+        </p:spPr>
+        <p:txBody>
+          <a:bodyPr wrap="none" lIns="50800" tIns="50800" rIns="50800" bIns="50800" anchor="ctr">
+            <a:spAutoFit/>
+          </a:bodyPr>
+          <a:lstStyle>
+            <a:lvl1pPr>
+              <a:defRPr sz="2400"/>
+            </a:lvl1pPr>
+          </a:lstStyle>
+          <a:p>
+            <a:pPr/>
+            <a:r>
+              <a:t>DAA/Backtracking, Branch&amp;Bound, NP-Complete</a:t>
             </a:r>
           </a:p>
         </p:txBody>
@@ -8785,47 +8785,7 @@
       </p:sp>
       <p:sp>
         <p:nvSpPr>
-          <p:cNvPr id="50" name="DAA/Dynamic Programming"/>
-          <p:cNvSpPr txBox="1"/>
-          <p:nvPr/>
-        </p:nvSpPr>
-        <p:spPr>
-          <a:xfrm>
-            <a:off x="423212" y="6963885"/>
-            <a:ext cx="3769679" cy="431552"/>
-          </a:xfrm>
-          <a:prstGeom prst="rect">
-            <a:avLst/>
-          </a:prstGeom>
-          <a:ln w="12700">
-            <a:miter lim="400000"/>
-          </a:ln>
-          <a:extLst>
-            <a:ext uri="{C572A759-6A51-4108-AA02-DFA0A04FC94B}">
-              <ma14:wrappingTextBoxFlag xmlns:ma14="http://schemas.microsoft.com/office/mac/drawingml/2011/main" val="1"/>
-            </a:ext>
-          </a:extLst>
-        </p:spPr>
-        <p:txBody>
-          <a:bodyPr wrap="none" lIns="50800" tIns="50800" rIns="50800" bIns="50800" anchor="ctr">
-            <a:spAutoFit/>
-          </a:bodyPr>
-          <a:lstStyle>
-            <a:lvl1pPr>
-              <a:defRPr sz="2400"/>
-            </a:lvl1pPr>
-          </a:lstStyle>
-          <a:p>
-            <a:pPr/>
-            <a:r>
-              <a:t>DAA/Dynamic Programming</a:t>
-            </a:r>
-          </a:p>
-        </p:txBody>
-      </p:sp>
-      <p:sp>
-        <p:nvSpPr>
-          <p:cNvPr id="51" name="RPR/"/>
+          <p:cNvPr id="50" name="RPR/"/>
           <p:cNvSpPr txBox="1"/>
           <p:nvPr/>
         </p:nvSpPr>
@@ -8859,6 +8819,46 @@
             <a:pPr/>
             <a:r>
               <a:t>RPR/</a:t>
+            </a:r>
+          </a:p>
+        </p:txBody>
+      </p:sp>
+      <p:sp>
+        <p:nvSpPr>
+          <p:cNvPr id="51" name="DAA/Backtracking, Branch&amp;Bound, NP-Complete"/>
+          <p:cNvSpPr txBox="1"/>
+          <p:nvPr/>
+        </p:nvSpPr>
+        <p:spPr>
+          <a:xfrm>
+            <a:off x="215739" y="6963885"/>
+            <a:ext cx="6436083" cy="431552"/>
+          </a:xfrm>
+          <a:prstGeom prst="rect">
+            <a:avLst/>
+          </a:prstGeom>
+          <a:ln w="12700">
+            <a:miter lim="400000"/>
+          </a:ln>
+          <a:extLst>
+            <a:ext uri="{C572A759-6A51-4108-AA02-DFA0A04FC94B}">
+              <ma14:wrappingTextBoxFlag xmlns:ma14="http://schemas.microsoft.com/office/mac/drawingml/2011/main" val="1"/>
+            </a:ext>
+          </a:extLst>
+        </p:spPr>
+        <p:txBody>
+          <a:bodyPr wrap="none" lIns="50800" tIns="50800" rIns="50800" bIns="50800" anchor="ctr">
+            <a:spAutoFit/>
+          </a:bodyPr>
+          <a:lstStyle>
+            <a:lvl1pPr>
+              <a:defRPr sz="2400"/>
+            </a:lvl1pPr>
+          </a:lstStyle>
+          <a:p>
+            <a:pPr/>
+            <a:r>
+              <a:t>DAA/Backtracking, Branch&amp;Bound, NP-Complete</a:t>
             </a:r>
           </a:p>
         </p:txBody>
@@ -8953,47 +8953,7 @@
       </p:sp>
       <p:sp>
         <p:nvSpPr>
-          <p:cNvPr id="55" name="DAA/Dynamic Programming"/>
-          <p:cNvSpPr txBox="1"/>
-          <p:nvPr/>
-        </p:nvSpPr>
-        <p:spPr>
-          <a:xfrm>
-            <a:off x="423212" y="6963885"/>
-            <a:ext cx="3769679" cy="431552"/>
-          </a:xfrm>
-          <a:prstGeom prst="rect">
-            <a:avLst/>
-          </a:prstGeom>
-          <a:ln w="12700">
-            <a:miter lim="400000"/>
-          </a:ln>
-          <a:extLst>
-            <a:ext uri="{C572A759-6A51-4108-AA02-DFA0A04FC94B}">
-              <ma14:wrappingTextBoxFlag xmlns:ma14="http://schemas.microsoft.com/office/mac/drawingml/2011/main" val="1"/>
-            </a:ext>
-          </a:extLst>
-        </p:spPr>
-        <p:txBody>
-          <a:bodyPr wrap="none" lIns="50800" tIns="50800" rIns="50800" bIns="50800" anchor="ctr">
-            <a:spAutoFit/>
-          </a:bodyPr>
-          <a:lstStyle>
-            <a:lvl1pPr>
-              <a:defRPr sz="2400"/>
-            </a:lvl1pPr>
-          </a:lstStyle>
-          <a:p>
-            <a:pPr/>
-            <a:r>
-              <a:t>DAA/Dynamic Programming</a:t>
-            </a:r>
-          </a:p>
-        </p:txBody>
-      </p:sp>
-      <p:sp>
-        <p:nvSpPr>
-          <p:cNvPr id="56" name="RPR/"/>
+          <p:cNvPr id="55" name="RPR/"/>
           <p:cNvSpPr txBox="1"/>
           <p:nvPr/>
         </p:nvSpPr>
@@ -9027,6 +8987,46 @@
             <a:pPr/>
             <a:r>
               <a:t>RPR/</a:t>
+            </a:r>
+          </a:p>
+        </p:txBody>
+      </p:sp>
+      <p:sp>
+        <p:nvSpPr>
+          <p:cNvPr id="56" name="DAA/Backtracking, Branch&amp;Bound, NP-Complete"/>
+          <p:cNvSpPr txBox="1"/>
+          <p:nvPr/>
+        </p:nvSpPr>
+        <p:spPr>
+          <a:xfrm>
+            <a:off x="215739" y="6963885"/>
+            <a:ext cx="6436083" cy="431552"/>
+          </a:xfrm>
+          <a:prstGeom prst="rect">
+            <a:avLst/>
+          </a:prstGeom>
+          <a:ln w="12700">
+            <a:miter lim="400000"/>
+          </a:ln>
+          <a:extLst>
+            <a:ext uri="{C572A759-6A51-4108-AA02-DFA0A04FC94B}">
+              <ma14:wrappingTextBoxFlag xmlns:ma14="http://schemas.microsoft.com/office/mac/drawingml/2011/main" val="1"/>
+            </a:ext>
+          </a:extLst>
+        </p:spPr>
+        <p:txBody>
+          <a:bodyPr wrap="none" lIns="50800" tIns="50800" rIns="50800" bIns="50800" anchor="ctr">
+            <a:spAutoFit/>
+          </a:bodyPr>
+          <a:lstStyle>
+            <a:lvl1pPr>
+              <a:defRPr sz="2400"/>
+            </a:lvl1pPr>
+          </a:lstStyle>
+          <a:p>
+            <a:pPr/>
+            <a:r>
+              <a:t>DAA/Backtracking, Branch&amp;Bound, NP-Complete</a:t>
             </a:r>
           </a:p>
         </p:txBody>
@@ -9193,47 +9193,7 @@
       </p:sp>
       <p:sp>
         <p:nvSpPr>
-          <p:cNvPr id="62" name="DAA/Dynamic Programming"/>
-          <p:cNvSpPr txBox="1"/>
-          <p:nvPr/>
-        </p:nvSpPr>
-        <p:spPr>
-          <a:xfrm>
-            <a:off x="423212" y="6963885"/>
-            <a:ext cx="3769679" cy="431552"/>
-          </a:xfrm>
-          <a:prstGeom prst="rect">
-            <a:avLst/>
-          </a:prstGeom>
-          <a:ln w="12700">
-            <a:miter lim="400000"/>
-          </a:ln>
-          <a:extLst>
-            <a:ext uri="{C572A759-6A51-4108-AA02-DFA0A04FC94B}">
-              <ma14:wrappingTextBoxFlag xmlns:ma14="http://schemas.microsoft.com/office/mac/drawingml/2011/main" val="1"/>
-            </a:ext>
-          </a:extLst>
-        </p:spPr>
-        <p:txBody>
-          <a:bodyPr wrap="none" lIns="50800" tIns="50800" rIns="50800" bIns="50800" anchor="ctr">
-            <a:spAutoFit/>
-          </a:bodyPr>
-          <a:lstStyle>
-            <a:lvl1pPr>
-              <a:defRPr sz="2400"/>
-            </a:lvl1pPr>
-          </a:lstStyle>
-          <a:p>
-            <a:pPr/>
-            <a:r>
-              <a:t>DAA/Dynamic Programming</a:t>
-            </a:r>
-          </a:p>
-        </p:txBody>
-      </p:sp>
-      <p:sp>
-        <p:nvSpPr>
-          <p:cNvPr id="63" name="RPR/"/>
+          <p:cNvPr id="62" name="RPR/"/>
           <p:cNvSpPr txBox="1"/>
           <p:nvPr/>
         </p:nvSpPr>
@@ -9267,6 +9227,46 @@
             <a:pPr/>
             <a:r>
               <a:t>RPR/</a:t>
+            </a:r>
+          </a:p>
+        </p:txBody>
+      </p:sp>
+      <p:sp>
+        <p:nvSpPr>
+          <p:cNvPr id="63" name="DAA/Backtracking, Branch&amp;Bound, NP-Complete"/>
+          <p:cNvSpPr txBox="1"/>
+          <p:nvPr/>
+        </p:nvSpPr>
+        <p:spPr>
+          <a:xfrm>
+            <a:off x="215739" y="6963885"/>
+            <a:ext cx="6436083" cy="431552"/>
+          </a:xfrm>
+          <a:prstGeom prst="rect">
+            <a:avLst/>
+          </a:prstGeom>
+          <a:ln w="12700">
+            <a:miter lim="400000"/>
+          </a:ln>
+          <a:extLst>
+            <a:ext uri="{C572A759-6A51-4108-AA02-DFA0A04FC94B}">
+              <ma14:wrappingTextBoxFlag xmlns:ma14="http://schemas.microsoft.com/office/mac/drawingml/2011/main" val="1"/>
+            </a:ext>
+          </a:extLst>
+        </p:spPr>
+        <p:txBody>
+          <a:bodyPr wrap="none" lIns="50800" tIns="50800" rIns="50800" bIns="50800" anchor="ctr">
+            <a:spAutoFit/>
+          </a:bodyPr>
+          <a:lstStyle>
+            <a:lvl1pPr>
+              <a:defRPr sz="2400"/>
+            </a:lvl1pPr>
+          </a:lstStyle>
+          <a:p>
+            <a:pPr/>
+            <a:r>
+              <a:t>DAA/Backtracking, Branch&amp;Bound, NP-Complete</a:t>
             </a:r>
           </a:p>
         </p:txBody>
@@ -9703,47 +9703,7 @@
       </p:sp>
       <p:sp>
         <p:nvSpPr>
-          <p:cNvPr id="67" name="DAA/Dynamic Programming"/>
-          <p:cNvSpPr txBox="1"/>
-          <p:nvPr/>
-        </p:nvSpPr>
-        <p:spPr>
-          <a:xfrm>
-            <a:off x="423212" y="6963885"/>
-            <a:ext cx="3769679" cy="431552"/>
-          </a:xfrm>
-          <a:prstGeom prst="rect">
-            <a:avLst/>
-          </a:prstGeom>
-          <a:ln w="12700">
-            <a:miter lim="400000"/>
-          </a:ln>
-          <a:extLst>
-            <a:ext uri="{C572A759-6A51-4108-AA02-DFA0A04FC94B}">
-              <ma14:wrappingTextBoxFlag xmlns:ma14="http://schemas.microsoft.com/office/mac/drawingml/2011/main" val="1"/>
-            </a:ext>
-          </a:extLst>
-        </p:spPr>
-        <p:txBody>
-          <a:bodyPr wrap="none" lIns="50800" tIns="50800" rIns="50800" bIns="50800" anchor="ctr">
-            <a:spAutoFit/>
-          </a:bodyPr>
-          <a:lstStyle>
-            <a:lvl1pPr>
-              <a:defRPr sz="2400"/>
-            </a:lvl1pPr>
-          </a:lstStyle>
-          <a:p>
-            <a:pPr/>
-            <a:r>
-              <a:t>DAA/Dynamic Programming</a:t>
-            </a:r>
-          </a:p>
-        </p:txBody>
-      </p:sp>
-      <p:sp>
-        <p:nvSpPr>
-          <p:cNvPr id="68" name="RPR/"/>
+          <p:cNvPr id="67" name="RPR/"/>
           <p:cNvSpPr txBox="1"/>
           <p:nvPr/>
         </p:nvSpPr>
@@ -9777,6 +9737,46 @@
             <a:pPr/>
             <a:r>
               <a:t>RPR/</a:t>
+            </a:r>
+          </a:p>
+        </p:txBody>
+      </p:sp>
+      <p:sp>
+        <p:nvSpPr>
+          <p:cNvPr id="68" name="DAA/Backtracking, Branch&amp;Bound, NP-Complete"/>
+          <p:cNvSpPr txBox="1"/>
+          <p:nvPr/>
+        </p:nvSpPr>
+        <p:spPr>
+          <a:xfrm>
+            <a:off x="215739" y="6963885"/>
+            <a:ext cx="6436083" cy="431552"/>
+          </a:xfrm>
+          <a:prstGeom prst="rect">
+            <a:avLst/>
+          </a:prstGeom>
+          <a:ln w="12700">
+            <a:miter lim="400000"/>
+          </a:ln>
+          <a:extLst>
+            <a:ext uri="{C572A759-6A51-4108-AA02-DFA0A04FC94B}">
+              <ma14:wrappingTextBoxFlag xmlns:ma14="http://schemas.microsoft.com/office/mac/drawingml/2011/main" val="1"/>
+            </a:ext>
+          </a:extLst>
+        </p:spPr>
+        <p:txBody>
+          <a:bodyPr wrap="none" lIns="50800" tIns="50800" rIns="50800" bIns="50800" anchor="ctr">
+            <a:spAutoFit/>
+          </a:bodyPr>
+          <a:lstStyle>
+            <a:lvl1pPr>
+              <a:defRPr sz="2400"/>
+            </a:lvl1pPr>
+          </a:lstStyle>
+          <a:p>
+            <a:pPr/>
+            <a:r>
+              <a:t>DAA/Backtracking, Branch&amp;Bound, NP-Complete</a:t>
             </a:r>
           </a:p>
         </p:txBody>
@@ -17321,50 +17321,50 @@
       </p:par>
     </p:tnLst>
     <p:bldLst>
+      <p:bldP build="whole" bldLvl="1" animBg="1" rev="0" advAuto="0" spid="115" grpId="10"/>
+      <p:bldP build="whole" bldLvl="1" animBg="1" rev="0" advAuto="0" spid="123" grpId="45"/>
+      <p:bldP build="whole" bldLvl="1" animBg="1" rev="0" advAuto="0" spid="94" grpId="9"/>
+      <p:bldP build="whole" bldLvl="1" animBg="1" rev="0" advAuto="0" spid="111" grpId="32"/>
+      <p:bldP build="whole" bldLvl="1" animBg="1" rev="0" advAuto="0" spid="106" grpId="39"/>
+      <p:bldP build="whole" bldLvl="1" animBg="1" rev="0" advAuto="0" spid="104" grpId="22"/>
+      <p:bldP build="whole" bldLvl="1" animBg="1" rev="0" advAuto="0" spid="118" grpId="25"/>
+      <p:bldP build="whole" bldLvl="1" animBg="1" rev="0" advAuto="0" spid="119" grpId="28"/>
+      <p:bldP build="whole" bldLvl="1" animBg="1" rev="0" advAuto="0" spid="99" grpId="17"/>
+      <p:bldP build="whole" bldLvl="1" animBg="1" rev="0" advAuto="0" spid="107" grpId="27"/>
+      <p:bldP build="whole" bldLvl="1" animBg="1" rev="0" advAuto="0" spid="119" grpId="31"/>
+      <p:bldP build="whole" bldLvl="1" animBg="1" rev="0" advAuto="0" spid="102" grpId="16"/>
+      <p:bldP build="whole" bldLvl="1" animBg="1" rev="0" advAuto="0" spid="90" grpId="3"/>
+      <p:bldP build="whole" bldLvl="1" animBg="1" rev="0" advAuto="0" spid="92" grpId="4"/>
+      <p:bldP build="whole" bldLvl="1" animBg="1" rev="0" advAuto="0" spid="118" grpId="33"/>
+      <p:bldP build="whole" bldLvl="1" animBg="1" rev="0" advAuto="0" spid="101" grpId="18"/>
+      <p:bldP build="whole" bldLvl="1" animBg="1" rev="0" advAuto="0" spid="96" grpId="12"/>
+      <p:bldP build="whole" bldLvl="1" animBg="1" rev="0" advAuto="0" spid="105" grpId="21"/>
+      <p:bldP build="whole" bldLvl="1" animBg="1" rev="0" advAuto="0" spid="108" grpId="26"/>
+      <p:bldP build="whole" bldLvl="1" animBg="1" rev="0" advAuto="0" spid="95" grpId="13"/>
+      <p:bldP build="whole" bldLvl="1" animBg="1" rev="0" advAuto="0" spid="117" grpId="20"/>
+      <p:bldP build="whole" bldLvl="1" animBg="1" rev="0" advAuto="0" spid="88" grpId="2"/>
+      <p:bldP build="whole" bldLvl="1" animBg="1" rev="0" advAuto="0" spid="110" grpId="30"/>
       <p:bldP build="whole" bldLvl="1" animBg="1" rev="0" advAuto="0" spid="93" grpId="6"/>
-      <p:bldP build="whole" bldLvl="1" animBg="1" rev="0" advAuto="0" spid="92" grpId="4"/>
-      <p:bldP build="whole" bldLvl="1" animBg="1" rev="0" advAuto="0" spid="106" grpId="39"/>
-      <p:bldP build="whole" bldLvl="1" animBg="1" rev="0" advAuto="0" spid="115" grpId="10"/>
-      <p:bldP build="whole" bldLvl="1" animBg="1" rev="0" advAuto="0" spid="113" grpId="1"/>
-      <p:bldP build="whole" bldLvl="1" animBg="1" rev="0" advAuto="0" spid="112" grpId="36"/>
-      <p:bldP build="whole" bldLvl="1" animBg="1" rev="0" advAuto="0" spid="104" grpId="38"/>
-      <p:bldP build="whole" bldLvl="1" animBg="1" rev="0" advAuto="0" spid="107" grpId="27"/>
-      <p:bldP build="whole" bldLvl="1" animBg="1" rev="0" advAuto="0" spid="108" grpId="26"/>
-      <p:bldP build="whole" bldLvl="1" animBg="1" rev="0" advAuto="0" spid="105" grpId="21"/>
-      <p:bldP build="whole" bldLvl="1" animBg="1" rev="0" advAuto="0" spid="119" grpId="28"/>
-      <p:bldP build="whole" bldLvl="1" animBg="1" rev="0" advAuto="0" spid="103" grpId="24"/>
-      <p:bldP build="whole" bldLvl="1" animBg="1" rev="0" advAuto="0" spid="98" grpId="14"/>
-      <p:bldP build="whole" bldLvl="1" animBg="1" rev="0" advAuto="0" spid="119" grpId="31"/>
+      <p:bldP build="whole" bldLvl="1" animBg="1" rev="0" advAuto="0" spid="109" grpId="29"/>
+      <p:bldP build="whole" bldLvl="1" animBg="1" rev="0" advAuto="0" spid="89" grpId="8"/>
+      <p:bldP build="whole" bldLvl="1" animBg="1" rev="0" advAuto="0" spid="114" grpId="5"/>
       <p:bldP build="whole" bldLvl="1" animBg="1" rev="0" advAuto="0" spid="108" grpId="34"/>
       <p:bldP build="whole" bldLvl="1" animBg="1" rev="0" advAuto="0" spid="107" grpId="35"/>
+      <p:bldP build="whole" bldLvl="1" animBg="1" rev="0" advAuto="0" spid="113" grpId="1"/>
+      <p:bldP build="whole" bldLvl="1" animBg="1" rev="0" advAuto="0" spid="116" grpId="15"/>
+      <p:bldP build="whole" bldLvl="1" animBg="1" rev="0" advAuto="0" spid="97" grpId="11"/>
+      <p:bldP build="whole" bldLvl="1" animBg="1" rev="0" advAuto="0" spid="112" grpId="36"/>
+      <p:bldP build="whole" bldLvl="1" animBg="1" rev="0" advAuto="0" spid="105" grpId="37"/>
+      <p:bldP build="whole" bldLvl="1" animBg="1" rev="0" advAuto="0" spid="98" grpId="14"/>
+      <p:bldP build="whole" bldLvl="1" animBg="1" rev="0" advAuto="0" spid="91" grpId="7"/>
+      <p:bldP build="whole" bldLvl="1" animBg="1" rev="0" advAuto="0" spid="104" grpId="38"/>
       <p:bldP build="whole" bldLvl="1" animBg="1" rev="0" advAuto="0" spid="120" grpId="42"/>
+      <p:bldP build="whole" bldLvl="1" animBg="1" rev="0" advAuto="0" spid="121" grpId="43"/>
+      <p:bldP build="whole" bldLvl="1" animBg="1" rev="0" advAuto="0" spid="103" grpId="24"/>
       <p:bldP build="whole" bldLvl="1" animBg="1" rev="0" advAuto="0" spid="122" grpId="44"/>
-      <p:bldP build="whole" bldLvl="1" animBg="1" rev="0" advAuto="0" spid="111" grpId="32"/>
-      <p:bldP build="whole" bldLvl="1" animBg="1" rev="0" advAuto="0" spid="123" grpId="45"/>
-      <p:bldP build="whole" bldLvl="1" animBg="1" rev="0" advAuto="0" spid="99" grpId="17"/>
-      <p:bldP build="whole" bldLvl="1" animBg="1" rev="0" advAuto="0" spid="94" grpId="9"/>
-      <p:bldP build="whole" bldLvl="1" animBg="1" rev="0" advAuto="0" spid="95" grpId="13"/>
-      <p:bldP build="whole" bldLvl="1" animBg="1" rev="0" advAuto="0" spid="118" grpId="25"/>
-      <p:bldP build="whole" bldLvl="1" animBg="1" rev="0" advAuto="0" spid="97" grpId="11"/>
-      <p:bldP build="whole" bldLvl="1" animBg="1" rev="0" advAuto="0" spid="101" grpId="18"/>
-      <p:bldP build="whole" bldLvl="1" animBg="1" rev="0" advAuto="0" spid="89" grpId="8"/>
-      <p:bldP build="whole" bldLvl="1" animBg="1" rev="0" advAuto="0" spid="102" grpId="16"/>
       <p:bldP build="whole" bldLvl="1" animBg="1" rev="0" advAuto="0" spid="100" grpId="19"/>
-      <p:bldP build="whole" bldLvl="1" animBg="1" rev="0" advAuto="0" spid="118" grpId="33"/>
-      <p:bldP build="whole" bldLvl="1" animBg="1" rev="0" advAuto="0" spid="105" grpId="37"/>
+      <p:bldP build="whole" bldLvl="1" animBg="1" rev="0" advAuto="0" spid="106" grpId="23"/>
       <p:bldP build="whole" bldLvl="1" animBg="1" rev="0" advAuto="0" spid="103" grpId="40"/>
-      <p:bldP build="whole" bldLvl="1" animBg="1" rev="0" advAuto="0" spid="116" grpId="15"/>
-      <p:bldP build="whole" bldLvl="1" animBg="1" rev="0" advAuto="0" spid="88" grpId="2"/>
-      <p:bldP build="whole" bldLvl="1" animBg="1" rev="0" advAuto="0" spid="121" grpId="43"/>
-      <p:bldP build="whole" bldLvl="1" animBg="1" rev="0" advAuto="0" spid="106" grpId="23"/>
-      <p:bldP build="whole" bldLvl="1" animBg="1" rev="0" advAuto="0" spid="109" grpId="29"/>
-      <p:bldP build="whole" bldLvl="1" animBg="1" rev="0" advAuto="0" spid="110" grpId="30"/>
-      <p:bldP build="whole" bldLvl="1" animBg="1" rev="0" advAuto="0" spid="91" grpId="7"/>
-      <p:bldP build="whole" bldLvl="1" animBg="1" rev="0" advAuto="0" spid="90" grpId="3"/>
-      <p:bldP build="whole" bldLvl="1" animBg="1" rev="0" advAuto="0" spid="96" grpId="12"/>
-      <p:bldP build="whole" bldLvl="1" animBg="1" rev="0" advAuto="0" spid="104" grpId="22"/>
-      <p:bldP build="whole" bldLvl="1" animBg="1" rev="0" advAuto="0" spid="114" grpId="5"/>
-      <p:bldP build="whole" bldLvl="1" animBg="1" rev="0" advAuto="0" spid="117" grpId="20"/>
     </p:bldLst>
   </p:timing>
 </p:sld>
@@ -17444,47 +17444,7 @@
       </p:sp>
       <p:sp>
         <p:nvSpPr>
-          <p:cNvPr id="127" name="DAA/Dynamic Programming"/>
-          <p:cNvSpPr txBox="1"/>
-          <p:nvPr/>
-        </p:nvSpPr>
-        <p:spPr>
-          <a:xfrm>
-            <a:off x="423212" y="6963885"/>
-            <a:ext cx="3769679" cy="431552"/>
-          </a:xfrm>
-          <a:prstGeom prst="rect">
-            <a:avLst/>
-          </a:prstGeom>
-          <a:ln w="12700">
-            <a:miter lim="400000"/>
-          </a:ln>
-          <a:extLst>
-            <a:ext uri="{C572A759-6A51-4108-AA02-DFA0A04FC94B}">
-              <ma14:wrappingTextBoxFlag xmlns:ma14="http://schemas.microsoft.com/office/mac/drawingml/2011/main" val="1"/>
-            </a:ext>
-          </a:extLst>
-        </p:spPr>
-        <p:txBody>
-          <a:bodyPr wrap="none" lIns="50800" tIns="50800" rIns="50800" bIns="50800" anchor="ctr">
-            <a:spAutoFit/>
-          </a:bodyPr>
-          <a:lstStyle>
-            <a:lvl1pPr>
-              <a:defRPr sz="2400"/>
-            </a:lvl1pPr>
-          </a:lstStyle>
-          <a:p>
-            <a:pPr/>
-            <a:r>
-              <a:t>DAA/Dynamic Programming</a:t>
-            </a:r>
-          </a:p>
-        </p:txBody>
-      </p:sp>
-      <p:sp>
-        <p:nvSpPr>
-          <p:cNvPr id="128" name="RPR/"/>
+          <p:cNvPr id="127" name="RPR/"/>
           <p:cNvSpPr txBox="1"/>
           <p:nvPr/>
         </p:nvSpPr>
@@ -17518,6 +17478,46 @@
             <a:pPr/>
             <a:r>
               <a:t>RPR/</a:t>
+            </a:r>
+          </a:p>
+        </p:txBody>
+      </p:sp>
+      <p:sp>
+        <p:nvSpPr>
+          <p:cNvPr id="128" name="DAA/Backtracking, Branch&amp;Bound, NP-Complete"/>
+          <p:cNvSpPr txBox="1"/>
+          <p:nvPr/>
+        </p:nvSpPr>
+        <p:spPr>
+          <a:xfrm>
+            <a:off x="215739" y="6963885"/>
+            <a:ext cx="6436083" cy="431552"/>
+          </a:xfrm>
+          <a:prstGeom prst="rect">
+            <a:avLst/>
+          </a:prstGeom>
+          <a:ln w="12700">
+            <a:miter lim="400000"/>
+          </a:ln>
+          <a:extLst>
+            <a:ext uri="{C572A759-6A51-4108-AA02-DFA0A04FC94B}">
+              <ma14:wrappingTextBoxFlag xmlns:ma14="http://schemas.microsoft.com/office/mac/drawingml/2011/main" val="1"/>
+            </a:ext>
+          </a:extLst>
+        </p:spPr>
+        <p:txBody>
+          <a:bodyPr wrap="none" lIns="50800" tIns="50800" rIns="50800" bIns="50800" anchor="ctr">
+            <a:spAutoFit/>
+          </a:bodyPr>
+          <a:lstStyle>
+            <a:lvl1pPr>
+              <a:defRPr sz="2400"/>
+            </a:lvl1pPr>
+          </a:lstStyle>
+          <a:p>
+            <a:pPr/>
+            <a:r>
+              <a:t>DAA/Backtracking, Branch&amp;Bound, NP-Complete</a:t>
             </a:r>
           </a:p>
         </p:txBody>
@@ -22624,8 +22624,8 @@
     <p:bldLst>
       <p:bldP build="whole" bldLvl="1" animBg="1" rev="0" advAuto="0" spid="169" grpId="3"/>
       <p:bldP build="whole" bldLvl="1" animBg="1" rev="0" advAuto="0" spid="162" grpId="1"/>
+      <p:bldP build="whole" bldLvl="1" animBg="1" rev="0" advAuto="0" spid="171" grpId="5"/>
       <p:bldP build="whole" bldLvl="1" animBg="1" rev="0" advAuto="0" spid="170" grpId="4"/>
-      <p:bldP build="whole" bldLvl="1" animBg="1" rev="0" advAuto="0" spid="171" grpId="5"/>
       <p:bldP build="whole" bldLvl="1" animBg="1" rev="0" advAuto="0" spid="168" grpId="2"/>
     </p:bldLst>
   </p:timing>
@@ -22706,47 +22706,7 @@
       </p:sp>
       <p:sp>
         <p:nvSpPr>
-          <p:cNvPr id="175" name="DAA/Dynamic Programming"/>
-          <p:cNvSpPr txBox="1"/>
-          <p:nvPr/>
-        </p:nvSpPr>
-        <p:spPr>
-          <a:xfrm>
-            <a:off x="423212" y="6963885"/>
-            <a:ext cx="3769679" cy="431552"/>
-          </a:xfrm>
-          <a:prstGeom prst="rect">
-            <a:avLst/>
-          </a:prstGeom>
-          <a:ln w="12700">
-            <a:miter lim="400000"/>
-          </a:ln>
-          <a:extLst>
-            <a:ext uri="{C572A759-6A51-4108-AA02-DFA0A04FC94B}">
-              <ma14:wrappingTextBoxFlag xmlns:ma14="http://schemas.microsoft.com/office/mac/drawingml/2011/main" val="1"/>
-            </a:ext>
-          </a:extLst>
-        </p:spPr>
-        <p:txBody>
-          <a:bodyPr wrap="none" lIns="50800" tIns="50800" rIns="50800" bIns="50800" anchor="ctr">
-            <a:spAutoFit/>
-          </a:bodyPr>
-          <a:lstStyle>
-            <a:lvl1pPr>
-              <a:defRPr sz="2400"/>
-            </a:lvl1pPr>
-          </a:lstStyle>
-          <a:p>
-            <a:pPr/>
-            <a:r>
-              <a:t>DAA/Dynamic Programming</a:t>
-            </a:r>
-          </a:p>
-        </p:txBody>
-      </p:sp>
-      <p:sp>
-        <p:nvSpPr>
-          <p:cNvPr id="176" name="RPR/"/>
+          <p:cNvPr id="175" name="RPR/"/>
           <p:cNvSpPr txBox="1"/>
           <p:nvPr/>
         </p:nvSpPr>
@@ -22780,6 +22740,46 @@
             <a:pPr/>
             <a:r>
               <a:t>RPR/</a:t>
+            </a:r>
+          </a:p>
+        </p:txBody>
+      </p:sp>
+      <p:sp>
+        <p:nvSpPr>
+          <p:cNvPr id="176" name="DAA/Backtracking, Branch&amp;Bound, NP-Complete"/>
+          <p:cNvSpPr txBox="1"/>
+          <p:nvPr/>
+        </p:nvSpPr>
+        <p:spPr>
+          <a:xfrm>
+            <a:off x="215739" y="6963885"/>
+            <a:ext cx="6436083" cy="431552"/>
+          </a:xfrm>
+          <a:prstGeom prst="rect">
+            <a:avLst/>
+          </a:prstGeom>
+          <a:ln w="12700">
+            <a:miter lim="400000"/>
+          </a:ln>
+          <a:extLst>
+            <a:ext uri="{C572A759-6A51-4108-AA02-DFA0A04FC94B}">
+              <ma14:wrappingTextBoxFlag xmlns:ma14="http://schemas.microsoft.com/office/mac/drawingml/2011/main" val="1"/>
+            </a:ext>
+          </a:extLst>
+        </p:spPr>
+        <p:txBody>
+          <a:bodyPr wrap="none" lIns="50800" tIns="50800" rIns="50800" bIns="50800" anchor="ctr">
+            <a:spAutoFit/>
+          </a:bodyPr>
+          <a:lstStyle>
+            <a:lvl1pPr>
+              <a:defRPr sz="2400"/>
+            </a:lvl1pPr>
+          </a:lstStyle>
+          <a:p>
+            <a:pPr/>
+            <a:r>
+              <a:t>DAA/Backtracking, Branch&amp;Bound, NP-Complete</a:t>
             </a:r>
           </a:p>
         </p:txBody>
@@ -31002,16 +31002,16 @@
       </p:par>
     </p:tnLst>
     <p:bldLst>
+      <p:bldP build="whole" bldLvl="1" animBg="1" rev="0" advAuto="0" spid="195" grpId="2"/>
       <p:bldP build="whole" bldLvl="1" animBg="1" rev="0" advAuto="0" spid="199" grpId="6"/>
+      <p:bldP build="whole" bldLvl="1" animBg="1" rev="0" advAuto="0" spid="201" grpId="8"/>
+      <p:bldP build="whole" bldLvl="1" animBg="1" rev="0" advAuto="0" spid="196" grpId="3"/>
+      <p:bldP build="whole" bldLvl="1" animBg="1" rev="0" advAuto="0" spid="200" grpId="7"/>
       <p:bldP build="whole" bldLvl="1" animBg="1" rev="0" advAuto="0" spid="197" grpId="4"/>
+      <p:bldP build="whole" bldLvl="1" animBg="1" rev="0" advAuto="0" spid="177" grpId="10"/>
       <p:bldP build="whole" bldLvl="1" animBg="1" rev="0" advAuto="0" spid="194" grpId="1"/>
-      <p:bldP build="whole" bldLvl="1" animBg="1" rev="0" advAuto="0" spid="177" grpId="10"/>
       <p:bldP build="whole" bldLvl="1" animBg="1" rev="0" advAuto="0" spid="198" grpId="5"/>
-      <p:bldP build="whole" bldLvl="1" animBg="1" rev="0" advAuto="0" spid="200" grpId="7"/>
-      <p:bldP build="whole" bldLvl="1" animBg="1" rev="0" advAuto="0" spid="201" grpId="8"/>
       <p:bldP build="whole" bldLvl="1" animBg="1" rev="0" advAuto="0" spid="202" grpId="9"/>
-      <p:bldP build="whole" bldLvl="1" animBg="1" rev="0" advAuto="0" spid="196" grpId="3"/>
-      <p:bldP build="whole" bldLvl="1" animBg="1" rev="0" advAuto="0" spid="195" grpId="2"/>
     </p:bldLst>
   </p:timing>
 </p:sld>
@@ -31100,47 +31100,7 @@
       </p:sp>
       <p:sp>
         <p:nvSpPr>
-          <p:cNvPr id="207" name="DAA/Dynamic Programming"/>
-          <p:cNvSpPr txBox="1"/>
-          <p:nvPr/>
-        </p:nvSpPr>
-        <p:spPr>
-          <a:xfrm>
-            <a:off x="423212" y="6963885"/>
-            <a:ext cx="3769679" cy="431552"/>
-          </a:xfrm>
-          <a:prstGeom prst="rect">
-            <a:avLst/>
-          </a:prstGeom>
-          <a:ln w="12700">
-            <a:miter lim="400000"/>
-          </a:ln>
-          <a:extLst>
-            <a:ext uri="{C572A759-6A51-4108-AA02-DFA0A04FC94B}">
-              <ma14:wrappingTextBoxFlag xmlns:ma14="http://schemas.microsoft.com/office/mac/drawingml/2011/main" val="1"/>
-            </a:ext>
-          </a:extLst>
-        </p:spPr>
-        <p:txBody>
-          <a:bodyPr wrap="none" lIns="50800" tIns="50800" rIns="50800" bIns="50800" anchor="ctr">
-            <a:spAutoFit/>
-          </a:bodyPr>
-          <a:lstStyle>
-            <a:lvl1pPr>
-              <a:defRPr sz="2400"/>
-            </a:lvl1pPr>
-          </a:lstStyle>
-          <a:p>
-            <a:pPr/>
-            <a:r>
-              <a:t>DAA/Dynamic Programming</a:t>
-            </a:r>
-          </a:p>
-        </p:txBody>
-      </p:sp>
-      <p:sp>
-        <p:nvSpPr>
-          <p:cNvPr id="208" name="RPR/"/>
+          <p:cNvPr id="207" name="RPR/"/>
           <p:cNvSpPr txBox="1"/>
           <p:nvPr/>
         </p:nvSpPr>
@@ -31174,6 +31134,46 @@
             <a:pPr/>
             <a:r>
               <a:t>RPR/</a:t>
+            </a:r>
+          </a:p>
+        </p:txBody>
+      </p:sp>
+      <p:sp>
+        <p:nvSpPr>
+          <p:cNvPr id="208" name="DAA/Backtracking, Branch&amp;Bound, NP-Complete"/>
+          <p:cNvSpPr txBox="1"/>
+          <p:nvPr/>
+        </p:nvSpPr>
+        <p:spPr>
+          <a:xfrm>
+            <a:off x="215739" y="6963885"/>
+            <a:ext cx="6436083" cy="431552"/>
+          </a:xfrm>
+          <a:prstGeom prst="rect">
+            <a:avLst/>
+          </a:prstGeom>
+          <a:ln w="12700">
+            <a:miter lim="400000"/>
+          </a:ln>
+          <a:extLst>
+            <a:ext uri="{C572A759-6A51-4108-AA02-DFA0A04FC94B}">
+              <ma14:wrappingTextBoxFlag xmlns:ma14="http://schemas.microsoft.com/office/mac/drawingml/2011/main" val="1"/>
+            </a:ext>
+          </a:extLst>
+        </p:spPr>
+        <p:txBody>
+          <a:bodyPr wrap="none" lIns="50800" tIns="50800" rIns="50800" bIns="50800" anchor="ctr">
+            <a:spAutoFit/>
+          </a:bodyPr>
+          <a:lstStyle>
+            <a:lvl1pPr>
+              <a:defRPr sz="2400"/>
+            </a:lvl1pPr>
+          </a:lstStyle>
+          <a:p>
+            <a:pPr/>
+            <a:r>
+              <a:t>DAA/Backtracking, Branch&amp;Bound, NP-Complete</a:t>
             </a:r>
           </a:p>
         </p:txBody>
@@ -37608,38 +37608,38 @@
       </p:par>
     </p:tnLst>
     <p:bldLst>
-      <p:bldP build="whole" bldLvl="1" animBg="1" rev="0" advAuto="0" spid="252" grpId="25"/>
-      <p:bldP build="whole" bldLvl="1" animBg="1" rev="0" advAuto="0" spid="247" grpId="20"/>
-      <p:bldP build="whole" bldLvl="1" animBg="1" rev="0" advAuto="0" spid="241" grpId="10"/>
+      <p:bldP build="whole" bldLvl="1" animBg="1" rev="0" advAuto="0" spid="226" grpId="1"/>
+      <p:bldP build="whole" bldLvl="1" animBg="1" rev="0" advAuto="0" spid="233" grpId="31"/>
+      <p:bldP build="whole" bldLvl="1" animBg="1" rev="0" advAuto="0" spid="245" grpId="14"/>
+      <p:bldP build="whole" bldLvl="1" animBg="1" rev="0" advAuto="0" spid="251" grpId="24"/>
+      <p:bldP build="whole" bldLvl="1" animBg="1" rev="0" advAuto="0" spid="239" grpId="8"/>
+      <p:bldP build="whole" bldLvl="1" animBg="1" rev="0" advAuto="0" spid="240" grpId="7"/>
       <p:bldP build="whole" bldLvl="1" animBg="1" rev="0" advAuto="0" spid="246" grpId="17"/>
-      <p:bldP build="whole" bldLvl="1" animBg="1" rev="0" advAuto="0" spid="254" grpId="27"/>
-      <p:bldP build="whole" bldLvl="1" animBg="1" rev="0" advAuto="0" spid="229" grpId="11"/>
+      <p:bldP build="whole" bldLvl="1" animBg="1" rev="0" advAuto="0" spid="255" grpId="29"/>
+      <p:bldP build="whole" bldLvl="1" animBg="1" rev="0" advAuto="0" spid="256" grpId="30"/>
+      <p:bldP build="whole" bldLvl="1" animBg="1" rev="0" advAuto="0" spid="227" grpId="2"/>
       <p:bldP build="whole" bldLvl="1" animBg="1" rev="0" advAuto="0" spid="235" grpId="4"/>
       <p:bldP build="whole" bldLvl="1" animBg="1" rev="0" advAuto="0" spid="257" grpId="28"/>
-      <p:bldP build="whole" bldLvl="1" animBg="1" rev="0" advAuto="0" spid="256" grpId="30"/>
+      <p:bldP build="whole" bldLvl="1" animBg="1" rev="0" advAuto="0" spid="236" grpId="5"/>
+      <p:bldP build="whole" bldLvl="1" animBg="1" rev="0" advAuto="0" spid="238" grpId="9"/>
+      <p:bldP build="whole" bldLvl="1" animBg="1" rev="0" advAuto="0" spid="253" grpId="23"/>
       <p:bldP build="whole" bldLvl="1" animBg="1" rev="0" advAuto="0" spid="248" grpId="18"/>
+      <p:bldP build="whole" bldLvl="1" animBg="1" rev="0" advAuto="0" spid="241" grpId="10"/>
+      <p:bldP build="whole" bldLvl="1" animBg="1" rev="0" advAuto="0" spid="228" grpId="6"/>
+      <p:bldP build="whole" bldLvl="1" animBg="1" rev="0" advAuto="0" spid="247" grpId="20"/>
+      <p:bldP build="whole" bldLvl="1" animBg="1" rev="0" advAuto="0" spid="237" grpId="3"/>
+      <p:bldP build="whole" bldLvl="1" animBg="1" rev="0" advAuto="0" spid="249" grpId="19"/>
+      <p:bldP build="whole" bldLvl="1" animBg="1" rev="0" advAuto="0" spid="232" grpId="26"/>
+      <p:bldP build="whole" bldLvl="1" animBg="1" rev="0" advAuto="0" spid="234" grpId="32"/>
+      <p:bldP build="whole" bldLvl="1" animBg="1" rev="0" advAuto="0" spid="252" grpId="25"/>
+      <p:bldP build="whole" bldLvl="1" animBg="1" rev="0" advAuto="0" spid="242" grpId="15"/>
+      <p:bldP build="whole" bldLvl="1" animBg="1" rev="0" advAuto="0" spid="254" grpId="27"/>
+      <p:bldP build="whole" bldLvl="1" animBg="1" rev="0" advAuto="0" spid="244" grpId="13"/>
+      <p:bldP build="whole" bldLvl="1" animBg="1" rev="0" advAuto="0" spid="229" grpId="11"/>
+      <p:bldP build="whole" bldLvl="1" animBg="1" rev="0" advAuto="0" spid="250" grpId="22"/>
       <p:bldP build="whole" bldLvl="1" animBg="1" rev="0" advAuto="0" spid="230" grpId="16"/>
-      <p:bldP build="whole" bldLvl="1" animBg="1" rev="0" advAuto="0" spid="232" grpId="26"/>
       <p:bldP build="whole" bldLvl="1" animBg="1" rev="0" advAuto="0" spid="243" grpId="12"/>
       <p:bldP build="whole" bldLvl="1" animBg="1" rev="0" advAuto="0" spid="231" grpId="21"/>
-      <p:bldP build="whole" bldLvl="1" animBg="1" rev="0" advAuto="0" spid="242" grpId="15"/>
-      <p:bldP build="whole" bldLvl="1" animBg="1" rev="0" advAuto="0" spid="239" grpId="8"/>
-      <p:bldP build="whole" bldLvl="1" animBg="1" rev="0" advAuto="0" spid="233" grpId="31"/>
-      <p:bldP build="whole" bldLvl="1" animBg="1" rev="0" advAuto="0" spid="226" grpId="1"/>
-      <p:bldP build="whole" bldLvl="1" animBg="1" rev="0" advAuto="0" spid="249" grpId="19"/>
-      <p:bldP build="whole" bldLvl="1" animBg="1" rev="0" advAuto="0" spid="234" grpId="32"/>
-      <p:bldP build="whole" bldLvl="1" animBg="1" rev="0" advAuto="0" spid="237" grpId="3"/>
-      <p:bldP build="whole" bldLvl="1" animBg="1" rev="0" advAuto="0" spid="240" grpId="7"/>
-      <p:bldP build="whole" bldLvl="1" animBg="1" rev="0" advAuto="0" spid="250" grpId="22"/>
-      <p:bldP build="whole" bldLvl="1" animBg="1" rev="0" advAuto="0" spid="251" grpId="24"/>
-      <p:bldP build="whole" bldLvl="1" animBg="1" rev="0" advAuto="0" spid="244" grpId="13"/>
-      <p:bldP build="whole" bldLvl="1" animBg="1" rev="0" advAuto="0" spid="245" grpId="14"/>
-      <p:bldP build="whole" bldLvl="1" animBg="1" rev="0" advAuto="0" spid="227" grpId="2"/>
-      <p:bldP build="whole" bldLvl="1" animBg="1" rev="0" advAuto="0" spid="255" grpId="29"/>
-      <p:bldP build="whole" bldLvl="1" animBg="1" rev="0" advAuto="0" spid="228" grpId="6"/>
-      <p:bldP build="whole" bldLvl="1" animBg="1" rev="0" advAuto="0" spid="238" grpId="9"/>
-      <p:bldP build="whole" bldLvl="1" animBg="1" rev="0" advAuto="0" spid="236" grpId="5"/>
-      <p:bldP build="whole" bldLvl="1" animBg="1" rev="0" advAuto="0" spid="253" grpId="23"/>
     </p:bldLst>
   </p:timing>
 </p:sld>
@@ -37715,47 +37715,7 @@
       </p:sp>
       <p:sp>
         <p:nvSpPr>
-          <p:cNvPr id="261" name="DAA/Dynamic Programming"/>
-          <p:cNvSpPr txBox="1"/>
-          <p:nvPr/>
-        </p:nvSpPr>
-        <p:spPr>
-          <a:xfrm>
-            <a:off x="423212" y="6963885"/>
-            <a:ext cx="3769679" cy="431552"/>
-          </a:xfrm>
-          <a:prstGeom prst="rect">
-            <a:avLst/>
-          </a:prstGeom>
-          <a:ln w="12700">
-            <a:miter lim="400000"/>
-          </a:ln>
-          <a:extLst>
-            <a:ext uri="{C572A759-6A51-4108-AA02-DFA0A04FC94B}">
-              <ma14:wrappingTextBoxFlag xmlns:ma14="http://schemas.microsoft.com/office/mac/drawingml/2011/main" val="1"/>
-            </a:ext>
-          </a:extLst>
-        </p:spPr>
-        <p:txBody>
-          <a:bodyPr wrap="none" lIns="50800" tIns="50800" rIns="50800" bIns="50800" anchor="ctr">
-            <a:spAutoFit/>
-          </a:bodyPr>
-          <a:lstStyle>
-            <a:lvl1pPr>
-              <a:defRPr sz="2400"/>
-            </a:lvl1pPr>
-          </a:lstStyle>
-          <a:p>
-            <a:pPr/>
-            <a:r>
-              <a:t>DAA/Dynamic Programming</a:t>
-            </a:r>
-          </a:p>
-        </p:txBody>
-      </p:sp>
-      <p:sp>
-        <p:nvSpPr>
-          <p:cNvPr id="262" name="RPR/"/>
+          <p:cNvPr id="261" name="RPR/"/>
           <p:cNvSpPr txBox="1"/>
           <p:nvPr/>
         </p:nvSpPr>
@@ -37789,6 +37749,46 @@
             <a:pPr/>
             <a:r>
               <a:t>RPR/</a:t>
+            </a:r>
+          </a:p>
+        </p:txBody>
+      </p:sp>
+      <p:sp>
+        <p:nvSpPr>
+          <p:cNvPr id="262" name="DAA/Backtracking, Branch&amp;Bound, NP-Complete"/>
+          <p:cNvSpPr txBox="1"/>
+          <p:nvPr/>
+        </p:nvSpPr>
+        <p:spPr>
+          <a:xfrm>
+            <a:off x="215739" y="6963885"/>
+            <a:ext cx="6436083" cy="431552"/>
+          </a:xfrm>
+          <a:prstGeom prst="rect">
+            <a:avLst/>
+          </a:prstGeom>
+          <a:ln w="12700">
+            <a:miter lim="400000"/>
+          </a:ln>
+          <a:extLst>
+            <a:ext uri="{C572A759-6A51-4108-AA02-DFA0A04FC94B}">
+              <ma14:wrappingTextBoxFlag xmlns:ma14="http://schemas.microsoft.com/office/mac/drawingml/2011/main" val="1"/>
+            </a:ext>
+          </a:extLst>
+        </p:spPr>
+        <p:txBody>
+          <a:bodyPr wrap="none" lIns="50800" tIns="50800" rIns="50800" bIns="50800" anchor="ctr">
+            <a:spAutoFit/>
+          </a:bodyPr>
+          <a:lstStyle>
+            <a:lvl1pPr>
+              <a:defRPr sz="2400"/>
+            </a:lvl1pPr>
+          </a:lstStyle>
+          <a:p>
+            <a:pPr/>
+            <a:r>
+              <a:t>DAA/Backtracking, Branch&amp;Bound, NP-Complete</a:t>
             </a:r>
           </a:p>
         </p:txBody>
@@ -40423,26 +40423,26 @@
       </p:par>
     </p:tnLst>
     <p:bldLst>
+      <p:bldP build="whole" bldLvl="1" animBg="1" rev="0" advAuto="0" spid="296" grpId="4"/>
+      <p:bldP build="whole" bldLvl="1" animBg="1" rev="0" advAuto="0" spid="295" grpId="2"/>
+      <p:bldP build="whole" bldLvl="1" animBg="1" rev="0" advAuto="0" spid="287" grpId="6"/>
+      <p:bldP build="p" bldLvl="5" animBg="1" rev="0" advAuto="0" spid="273" grpId="1"/>
+      <p:bldP build="whole" bldLvl="1" animBg="1" rev="0" advAuto="0" spid="282" grpId="14"/>
+      <p:bldP build="whole" bldLvl="1" animBg="1" rev="0" advAuto="0" spid="291" grpId="18"/>
+      <p:bldP build="p" bldLvl="5" animBg="1" rev="0" advAuto="0" spid="288" grpId="9"/>
+      <p:bldP build="whole" bldLvl="1" animBg="1" rev="0" advAuto="0" spid="281" grpId="17"/>
+      <p:bldP build="p" bldLvl="5" animBg="1" rev="0" advAuto="0" spid="292" grpId="19"/>
+      <p:bldP build="whole" bldLvl="1" animBg="1" rev="0" advAuto="0" spid="285" grpId="8"/>
+      <p:bldP build="p" bldLvl="5" animBg="1" rev="0" advAuto="0" spid="289" grpId="12"/>
       <p:bldP build="whole" bldLvl="1" animBg="1" rev="0" advAuto="0" spid="285" grpId="10"/>
+      <p:bldP build="whole" bldLvl="1" animBg="1" rev="0" advAuto="0" spid="294" grpId="3"/>
       <p:bldP build="whole" bldLvl="1" animBg="1" rev="0" advAuto="0" spid="284" grpId="15"/>
-      <p:bldP build="whole" bldLvl="1" animBg="1" rev="0" advAuto="0" spid="282" grpId="7"/>
-      <p:bldP build="whole" bldLvl="1" animBg="1" rev="0" advAuto="0" spid="281" grpId="17"/>
-      <p:bldP build="whole" bldLvl="1" animBg="1" rev="0" advAuto="0" spid="282" grpId="14"/>
-      <p:bldP build="whole" bldLvl="1" animBg="1" rev="0" advAuto="0" spid="287" grpId="6"/>
+      <p:bldP build="whole" bldLvl="1" animBg="1" rev="0" advAuto="0" spid="283" grpId="16"/>
       <p:bldP build="whole" bldLvl="1" animBg="1" rev="0" advAuto="0" spid="286" grpId="5"/>
       <p:bldP build="p" bldLvl="5" animBg="1" rev="0" advAuto="0" spid="293" grpId="20"/>
-      <p:bldP build="whole" bldLvl="1" animBg="1" rev="0" advAuto="0" spid="291" grpId="18"/>
       <p:bldP build="whole" bldLvl="1" animBg="1" rev="0" advAuto="0" spid="290" grpId="11"/>
-      <p:bldP build="whole" bldLvl="1" animBg="1" rev="0" advAuto="0" spid="296" grpId="4"/>
       <p:bldP build="whole" bldLvl="1" animBg="1" rev="0" advAuto="0" spid="290" grpId="13"/>
-      <p:bldP build="p" bldLvl="5" animBg="1" rev="0" advAuto="0" spid="292" grpId="19"/>
-      <p:bldP build="whole" bldLvl="1" animBg="1" rev="0" advAuto="0" spid="294" grpId="3"/>
-      <p:bldP build="whole" bldLvl="1" animBg="1" rev="0" advAuto="0" spid="283" grpId="16"/>
-      <p:bldP build="whole" bldLvl="1" animBg="1" rev="0" advAuto="0" spid="285" grpId="8"/>
-      <p:bldP build="p" bldLvl="5" animBg="1" rev="0" advAuto="0" spid="273" grpId="1"/>
-      <p:bldP build="p" bldLvl="5" animBg="1" rev="0" advAuto="0" spid="289" grpId="12"/>
-      <p:bldP build="p" bldLvl="5" animBg="1" rev="0" advAuto="0" spid="288" grpId="9"/>
-      <p:bldP build="whole" bldLvl="1" animBg="1" rev="0" advAuto="0" spid="295" grpId="2"/>
+      <p:bldP build="whole" bldLvl="1" animBg="1" rev="0" advAuto="0" spid="282" grpId="7"/>
     </p:bldLst>
   </p:timing>
 </p:sld>

</xml_diff>

<commit_message>
Added youtube video link in resource
</commit_message>
<xml_diff>
--- a/Slides-RPR/2019-H1-DAA-L41-BackTrack-Intro.pptx
+++ b/Slides-RPR/2019-H1-DAA-L41-BackTrack-Intro.pptx
@@ -10568,13 +10568,13 @@
     </p:tnLst>
     <p:bldLst>
       <p:bldP build="whole" bldLvl="1" animBg="1" rev="0" advAuto="0" spid="339" grpId="4"/>
+      <p:bldP build="whole" bldLvl="1" animBg="1" rev="0" advAuto="0" spid="342" grpId="7"/>
       <p:bldP build="whole" bldLvl="1" animBg="1" rev="0" advAuto="0" spid="336" grpId="1"/>
-      <p:bldP build="whole" bldLvl="1" animBg="1" rev="0" advAuto="0" spid="341" grpId="6"/>
-      <p:bldP build="whole" bldLvl="1" animBg="1" rev="0" advAuto="0" spid="338" grpId="3"/>
       <p:bldP build="whole" bldLvl="1" animBg="1" rev="0" advAuto="0" spid="343" grpId="8"/>
-      <p:bldP build="whole" bldLvl="1" animBg="1" rev="0" advAuto="0" spid="342" grpId="7"/>
       <p:bldP build="whole" bldLvl="1" animBg="1" rev="0" advAuto="0" spid="340" grpId="5"/>
       <p:bldP build="whole" bldLvl="1" animBg="1" rev="0" advAuto="0" spid="337" grpId="2"/>
+      <p:bldP build="whole" bldLvl="1" animBg="1" rev="0" advAuto="0" spid="338" grpId="3"/>
+      <p:bldP build="whole" bldLvl="1" animBg="1" rev="0" advAuto="0" spid="341" grpId="6"/>
     </p:bldLst>
   </p:timing>
 </p:sld>
@@ -13497,13 +13497,40 @@
           <a:p>
             <a:pPr/>
             <a:r>
-              <a:t>R1: Introduction to Algorithms</a:t>
+              <a:t>R</a:t>
+            </a:r>
+            <a:r>
+              <a:rPr>
+                <a:latin typeface="Arial"/>
+                <a:ea typeface="Arial"/>
+                <a:cs typeface="Arial"/>
+                <a:sym typeface="Arial"/>
+              </a:rPr>
+              <a:t>1</a:t>
+            </a:r>
+            <a:r>
+              <a:t>: Introduction to Algorithms</a:t>
             </a:r>
           </a:p>
           <a:p>
             <a:pPr lvl="2"/>
             <a:r>
               <a:t>Cormen et al.</a:t>
+            </a:r>
+          </a:p>
+          <a:p>
+            <a:pPr/>
+            <a:r>
+              <a:t>Youtube link of video lecture </a:t>
+            </a:r>
+          </a:p>
+          <a:p>
+            <a:pPr lvl="1"/>
+            <a:r>
+              <a:rPr u="sng">
+                <a:hlinkClick r:id="rId2" invalidUrl="" action="" tgtFrame="" tooltip="" history="1" highlightClick="0" endSnd="0"/>
+              </a:rPr>
+              <a:t>https://www.youtube.com/watch?v=Jcnk_hwS08A</a:t>
             </a:r>
           </a:p>
         </p:txBody>
@@ -22073,50 +22100,50 @@
       </p:par>
     </p:tnLst>
     <p:bldLst>
+      <p:bldP build="whole" bldLvl="1" animBg="1" rev="0" advAuto="0" spid="118" grpId="25"/>
+      <p:bldP build="whole" bldLvl="1" animBg="1" rev="0" advAuto="0" spid="104" grpId="38"/>
+      <p:bldP build="whole" bldLvl="1" animBg="1" rev="0" advAuto="0" spid="122" grpId="44"/>
+      <p:bldP build="whole" bldLvl="1" animBg="1" rev="0" advAuto="0" spid="98" grpId="14"/>
+      <p:bldP build="whole" bldLvl="1" animBg="1" rev="0" advAuto="0" spid="118" grpId="33"/>
+      <p:bldP build="whole" bldLvl="1" animBg="1" rev="0" advAuto="0" spid="107" grpId="27"/>
+      <p:bldP build="whole" bldLvl="1" animBg="1" rev="0" advAuto="0" spid="100" grpId="19"/>
+      <p:bldP build="whole" bldLvl="1" animBg="1" rev="0" advAuto="0" spid="103" grpId="24"/>
+      <p:bldP build="whole" bldLvl="1" animBg="1" rev="0" advAuto="0" spid="117" grpId="20"/>
+      <p:bldP build="whole" bldLvl="1" animBg="1" rev="0" advAuto="0" spid="123" grpId="45"/>
+      <p:bldP build="whole" bldLvl="1" animBg="1" rev="0" advAuto="0" spid="105" grpId="21"/>
+      <p:bldP build="whole" bldLvl="1" animBg="1" rev="0" advAuto="0" spid="107" grpId="35"/>
+      <p:bldP build="whole" bldLvl="1" animBg="1" rev="0" advAuto="0" spid="96" grpId="12"/>
+      <p:bldP build="whole" bldLvl="1" animBg="1" rev="0" advAuto="0" spid="106" grpId="23"/>
+      <p:bldP build="whole" bldLvl="1" animBg="1" rev="0" advAuto="0" spid="99" grpId="17"/>
+      <p:bldP build="whole" bldLvl="1" animBg="1" rev="0" advAuto="0" spid="103" grpId="40"/>
+      <p:bldP build="whole" bldLvl="1" animBg="1" rev="0" advAuto="0" spid="111" grpId="32"/>
+      <p:bldP build="whole" bldLvl="1" animBg="1" rev="0" advAuto="0" spid="95" grpId="13"/>
+      <p:bldP build="whole" bldLvl="1" animBg="1" rev="0" advAuto="0" spid="115" grpId="10"/>
+      <p:bldP build="whole" bldLvl="1" animBg="1" rev="0" advAuto="0" spid="120" grpId="42"/>
+      <p:bldP build="whole" bldLvl="1" animBg="1" rev="0" advAuto="0" spid="109" grpId="29"/>
+      <p:bldP build="whole" bldLvl="1" animBg="1" rev="0" advAuto="0" spid="102" grpId="16"/>
+      <p:bldP build="whole" bldLvl="1" animBg="1" rev="0" advAuto="0" spid="91" grpId="7"/>
+      <p:bldP build="whole" bldLvl="1" animBg="1" rev="0" advAuto="0" spid="105" grpId="37"/>
       <p:bldP build="whole" bldLvl="1" animBg="1" rev="0" advAuto="0" spid="108" grpId="26"/>
-      <p:bldP build="whole" bldLvl="1" animBg="1" rev="0" advAuto="0" spid="110" grpId="30"/>
-      <p:bldP build="whole" bldLvl="1" animBg="1" rev="0" advAuto="0" spid="104" grpId="38"/>
+      <p:bldP build="whole" bldLvl="1" animBg="1" rev="0" advAuto="0" spid="112" grpId="36"/>
+      <p:bldP build="whole" bldLvl="1" animBg="1" rev="0" advAuto="0" spid="119" grpId="28"/>
       <p:bldP build="whole" bldLvl="1" animBg="1" rev="0" advAuto="0" spid="106" grpId="39"/>
-      <p:bldP build="whole" bldLvl="1" animBg="1" rev="0" advAuto="0" spid="119" grpId="28"/>
-      <p:bldP build="whole" bldLvl="1" animBg="1" rev="0" advAuto="0" spid="105" grpId="21"/>
-      <p:bldP build="whole" bldLvl="1" animBg="1" rev="0" advAuto="0" spid="121" grpId="43"/>
       <p:bldP build="whole" bldLvl="1" animBg="1" rev="0" advAuto="0" spid="119" grpId="31"/>
       <p:bldP build="whole" bldLvl="1" animBg="1" rev="0" advAuto="0" spid="108" grpId="34"/>
-      <p:bldP build="whole" bldLvl="1" animBg="1" rev="0" advAuto="0" spid="111" grpId="32"/>
-      <p:bldP build="whole" bldLvl="1" animBg="1" rev="0" advAuto="0" spid="90" grpId="3"/>
-      <p:bldP build="whole" bldLvl="1" animBg="1" rev="0" advAuto="0" spid="103" grpId="40"/>
-      <p:bldP build="whole" bldLvl="1" animBg="1" rev="0" advAuto="0" spid="112" grpId="36"/>
-      <p:bldP build="whole" bldLvl="1" animBg="1" rev="0" advAuto="0" spid="118" grpId="25"/>
-      <p:bldP build="whole" bldLvl="1" animBg="1" rev="0" advAuto="0" spid="120" grpId="42"/>
-      <p:bldP build="whole" bldLvl="1" animBg="1" rev="0" advAuto="0" spid="105" grpId="37"/>
-      <p:bldP build="whole" bldLvl="1" animBg="1" rev="0" advAuto="0" spid="107" grpId="27"/>
-      <p:bldP build="whole" bldLvl="1" animBg="1" rev="0" advAuto="0" spid="122" grpId="44"/>
-      <p:bldP build="whole" bldLvl="1" animBg="1" rev="0" advAuto="0" spid="118" grpId="33"/>
-      <p:bldP build="whole" bldLvl="1" animBg="1" rev="0" advAuto="0" spid="117" grpId="20"/>
-      <p:bldP build="whole" bldLvl="1" animBg="1" rev="0" advAuto="0" spid="102" grpId="16"/>
-      <p:bldP build="whole" bldLvl="1" animBg="1" rev="0" advAuto="0" spid="107" grpId="35"/>
-      <p:bldP build="whole" bldLvl="1" animBg="1" rev="0" advAuto="0" spid="88" grpId="2"/>
-      <p:bldP build="whole" bldLvl="1" animBg="1" rev="0" advAuto="0" spid="115" grpId="10"/>
-      <p:bldP build="whole" bldLvl="1" animBg="1" rev="0" advAuto="0" spid="91" grpId="7"/>
-      <p:bldP build="whole" bldLvl="1" animBg="1" rev="0" advAuto="0" spid="101" grpId="18"/>
+      <p:bldP build="whole" bldLvl="1" animBg="1" rev="0" advAuto="0" spid="93" grpId="6"/>
       <p:bldP build="whole" bldLvl="1" animBg="1" rev="0" advAuto="0" spid="92" grpId="4"/>
       <p:bldP build="whole" bldLvl="1" animBg="1" rev="0" advAuto="0" spid="89" grpId="8"/>
+      <p:bldP build="whole" bldLvl="1" animBg="1" rev="0" advAuto="0" spid="101" grpId="18"/>
+      <p:bldP build="whole" bldLvl="1" animBg="1" rev="0" advAuto="0" spid="88" grpId="2"/>
+      <p:bldP build="whole" bldLvl="1" animBg="1" rev="0" advAuto="0" spid="104" grpId="22"/>
+      <p:bldP build="whole" bldLvl="1" animBg="1" rev="0" advAuto="0" spid="90" grpId="3"/>
+      <p:bldP build="whole" bldLvl="1" animBg="1" rev="0" advAuto="0" spid="116" grpId="15"/>
+      <p:bldP build="whole" bldLvl="1" animBg="1" rev="0" advAuto="0" spid="110" grpId="30"/>
+      <p:bldP build="whole" bldLvl="1" animBg="1" rev="0" advAuto="0" spid="94" grpId="9"/>
       <p:bldP build="whole" bldLvl="1" animBg="1" rev="0" advAuto="0" spid="114" grpId="5"/>
-      <p:bldP build="whole" bldLvl="1" animBg="1" rev="0" advAuto="0" spid="100" grpId="19"/>
-      <p:bldP build="whole" bldLvl="1" animBg="1" rev="0" advAuto="0" spid="93" grpId="6"/>
-      <p:bldP build="whole" bldLvl="1" animBg="1" rev="0" advAuto="0" spid="104" grpId="22"/>
-      <p:bldP build="whole" bldLvl="1" animBg="1" rev="0" advAuto="0" spid="106" grpId="23"/>
-      <p:bldP build="whole" bldLvl="1" animBg="1" rev="0" advAuto="0" spid="109" grpId="29"/>
-      <p:bldP build="whole" bldLvl="1" animBg="1" rev="0" advAuto="0" spid="98" grpId="14"/>
       <p:bldP build="whole" bldLvl="1" animBg="1" rev="0" advAuto="0" spid="97" grpId="11"/>
-      <p:bldP build="whole" bldLvl="1" animBg="1" rev="0" advAuto="0" spid="123" grpId="45"/>
-      <p:bldP build="whole" bldLvl="1" animBg="1" rev="0" advAuto="0" spid="96" grpId="12"/>
-      <p:bldP build="whole" bldLvl="1" animBg="1" rev="0" advAuto="0" spid="116" grpId="15"/>
       <p:bldP build="whole" bldLvl="1" animBg="1" rev="0" advAuto="0" spid="113" grpId="1"/>
-      <p:bldP build="whole" bldLvl="1" animBg="1" rev="0" advAuto="0" spid="94" grpId="9"/>
-      <p:bldP build="whole" bldLvl="1" animBg="1" rev="0" advAuto="0" spid="95" grpId="13"/>
-      <p:bldP build="whole" bldLvl="1" animBg="1" rev="0" advAuto="0" spid="99" grpId="17"/>
-      <p:bldP build="whole" bldLvl="1" animBg="1" rev="0" advAuto="0" spid="103" grpId="24"/>
+      <p:bldP build="whole" bldLvl="1" animBg="1" rev="0" advAuto="0" spid="121" grpId="43"/>
     </p:bldLst>
   </p:timing>
 </p:sld>
@@ -27374,11 +27401,11 @@
       </p:par>
     </p:tnLst>
     <p:bldLst>
+      <p:bldP build="whole" bldLvl="1" animBg="1" rev="0" advAuto="0" spid="168" grpId="2"/>
+      <p:bldP build="whole" bldLvl="1" animBg="1" rev="0" advAuto="0" spid="162" grpId="1"/>
+      <p:bldP build="whole" bldLvl="1" animBg="1" rev="0" advAuto="0" spid="171" grpId="5"/>
+      <p:bldP build="whole" bldLvl="1" animBg="1" rev="0" advAuto="0" spid="170" grpId="4"/>
       <p:bldP build="whole" bldLvl="1" animBg="1" rev="0" advAuto="0" spid="169" grpId="3"/>
-      <p:bldP build="whole" bldLvl="1" animBg="1" rev="0" advAuto="0" spid="162" grpId="1"/>
-      <p:bldP build="whole" bldLvl="1" animBg="1" rev="0" advAuto="0" spid="168" grpId="2"/>
-      <p:bldP build="whole" bldLvl="1" animBg="1" rev="0" advAuto="0" spid="170" grpId="4"/>
-      <p:bldP build="whole" bldLvl="1" animBg="1" rev="0" advAuto="0" spid="171" grpId="5"/>
     </p:bldLst>
   </p:timing>
 </p:sld>
@@ -35754,16 +35781,16 @@
       </p:par>
     </p:tnLst>
     <p:bldLst>
-      <p:bldP build="whole" bldLvl="1" animBg="1" rev="0" advAuto="0" spid="195" grpId="2"/>
+      <p:bldP build="whole" bldLvl="1" animBg="1" rev="0" advAuto="0" spid="194" grpId="1"/>
+      <p:bldP build="whole" bldLvl="1" animBg="1" rev="0" advAuto="0" spid="200" grpId="7"/>
+      <p:bldP build="whole" bldLvl="1" animBg="1" rev="0" advAuto="0" spid="202" grpId="9"/>
+      <p:bldP build="whole" bldLvl="1" animBg="1" rev="0" advAuto="0" spid="177" grpId="10"/>
+      <p:bldP build="whole" bldLvl="1" animBg="1" rev="0" advAuto="0" spid="197" grpId="4"/>
+      <p:bldP build="whole" bldLvl="1" animBg="1" rev="0" advAuto="0" spid="201" grpId="8"/>
       <p:bldP build="whole" bldLvl="1" animBg="1" rev="0" advAuto="0" spid="198" grpId="5"/>
-      <p:bldP build="whole" bldLvl="1" animBg="1" rev="0" advAuto="0" spid="201" grpId="8"/>
-      <p:bldP build="whole" bldLvl="1" animBg="1" rev="0" advAuto="0" spid="194" grpId="1"/>
-      <p:bldP build="whole" bldLvl="1" animBg="1" rev="0" advAuto="0" spid="202" grpId="9"/>
-      <p:bldP build="whole" bldLvl="1" animBg="1" rev="0" advAuto="0" spid="200" grpId="7"/>
-      <p:bldP build="whole" bldLvl="1" animBg="1" rev="0" advAuto="0" spid="197" grpId="4"/>
-      <p:bldP build="whole" bldLvl="1" animBg="1" rev="0" advAuto="0" spid="177" grpId="10"/>
       <p:bldP build="whole" bldLvl="1" animBg="1" rev="0" advAuto="0" spid="199" grpId="6"/>
       <p:bldP build="whole" bldLvl="1" animBg="1" rev="0" advAuto="0" spid="196" grpId="3"/>
+      <p:bldP build="whole" bldLvl="1" animBg="1" rev="0" advAuto="0" spid="195" grpId="2"/>
     </p:bldLst>
   </p:timing>
 </p:sld>
@@ -42360,38 +42387,38 @@
       </p:par>
     </p:tnLst>
     <p:bldLst>
-      <p:bldP build="whole" bldLvl="1" animBg="1" rev="0" advAuto="0" spid="237" grpId="3"/>
-      <p:bldP build="whole" bldLvl="1" animBg="1" rev="0" advAuto="0" spid="248" grpId="18"/>
-      <p:bldP build="whole" bldLvl="1" animBg="1" rev="0" advAuto="0" spid="228" grpId="6"/>
-      <p:bldP build="whole" bldLvl="1" animBg="1" rev="0" advAuto="0" spid="239" grpId="8"/>
-      <p:bldP build="whole" bldLvl="1" animBg="1" rev="0" advAuto="0" spid="250" grpId="22"/>
-      <p:bldP build="whole" bldLvl="1" animBg="1" rev="0" advAuto="0" spid="226" grpId="1"/>
-      <p:bldP build="whole" bldLvl="1" animBg="1" rev="0" advAuto="0" spid="252" grpId="25"/>
-      <p:bldP build="whole" bldLvl="1" animBg="1" rev="0" advAuto="0" spid="229" grpId="11"/>
+      <p:bldP build="whole" bldLvl="1" animBg="1" rev="0" advAuto="0" spid="236" grpId="5"/>
+      <p:bldP build="whole" bldLvl="1" animBg="1" rev="0" advAuto="0" spid="241" grpId="10"/>
       <p:bldP build="whole" bldLvl="1" animBg="1" rev="0" advAuto="0" spid="246" grpId="17"/>
       <p:bldP build="whole" bldLvl="1" animBg="1" rev="0" advAuto="0" spid="235" grpId="4"/>
+      <p:bldP build="whole" bldLvl="1" animBg="1" rev="0" advAuto="0" spid="242" grpId="15"/>
+      <p:bldP build="whole" bldLvl="1" animBg="1" rev="0" advAuto="0" spid="228" grpId="6"/>
+      <p:bldP build="whole" bldLvl="1" animBg="1" rev="0" advAuto="0" spid="252" grpId="25"/>
+      <p:bldP build="whole" bldLvl="1" animBg="1" rev="0" advAuto="0" spid="247" grpId="20"/>
+      <p:bldP build="whole" bldLvl="1" animBg="1" rev="0" advAuto="0" spid="231" grpId="21"/>
+      <p:bldP build="whole" bldLvl="1" animBg="1" rev="0" advAuto="0" spid="248" grpId="18"/>
+      <p:bldP build="whole" bldLvl="1" animBg="1" rev="0" advAuto="0" spid="256" grpId="30"/>
+      <p:bldP build="whole" bldLvl="1" animBg="1" rev="0" advAuto="0" spid="226" grpId="1"/>
+      <p:bldP build="whole" bldLvl="1" animBg="1" rev="0" advAuto="0" spid="257" grpId="28"/>
+      <p:bldP build="whole" bldLvl="1" animBg="1" rev="0" advAuto="0" spid="234" grpId="32"/>
+      <p:bldP build="whole" bldLvl="1" animBg="1" rev="0" advAuto="0" spid="251" grpId="24"/>
+      <p:bldP build="whole" bldLvl="1" animBg="1" rev="0" advAuto="0" spid="249" grpId="19"/>
+      <p:bldP build="whole" bldLvl="1" animBg="1" rev="0" advAuto="0" spid="254" grpId="27"/>
+      <p:bldP build="whole" bldLvl="1" animBg="1" rev="0" advAuto="0" spid="250" grpId="22"/>
+      <p:bldP build="whole" bldLvl="1" animBg="1" rev="0" advAuto="0" spid="227" grpId="2"/>
       <p:bldP build="whole" bldLvl="1" animBg="1" rev="0" advAuto="0" spid="232" grpId="26"/>
-      <p:bldP build="whole" bldLvl="1" animBg="1" rev="0" advAuto="0" spid="227" grpId="2"/>
-      <p:bldP build="whole" bldLvl="1" animBg="1" rev="0" advAuto="0" spid="249" grpId="19"/>
+      <p:bldP build="whole" bldLvl="1" animBg="1" rev="0" advAuto="0" spid="244" grpId="13"/>
+      <p:bldP build="whole" bldLvl="1" animBg="1" rev="0" advAuto="0" spid="238" grpId="9"/>
+      <p:bldP build="whole" bldLvl="1" animBg="1" rev="0" advAuto="0" spid="230" grpId="16"/>
       <p:bldP build="whole" bldLvl="1" animBg="1" rev="0" advAuto="0" spid="253" grpId="23"/>
-      <p:bldP build="whole" bldLvl="1" animBg="1" rev="0" advAuto="0" spid="254" grpId="27"/>
-      <p:bldP build="whole" bldLvl="1" animBg="1" rev="0" advAuto="0" spid="257" grpId="28"/>
-      <p:bldP build="whole" bldLvl="1" animBg="1" rev="0" advAuto="0" spid="230" grpId="16"/>
+      <p:bldP build="whole" bldLvl="1" animBg="1" rev="0" advAuto="0" spid="243" grpId="12"/>
+      <p:bldP build="whole" bldLvl="1" animBg="1" rev="0" advAuto="0" spid="239" grpId="8"/>
+      <p:bldP build="whole" bldLvl="1" animBg="1" rev="0" advAuto="0" spid="237" grpId="3"/>
+      <p:bldP build="whole" bldLvl="1" animBg="1" rev="0" advAuto="0" spid="240" grpId="7"/>
+      <p:bldP build="whole" bldLvl="1" animBg="1" rev="0" advAuto="0" spid="245" grpId="14"/>
       <p:bldP build="whole" bldLvl="1" animBg="1" rev="0" advAuto="0" spid="255" grpId="29"/>
-      <p:bldP build="whole" bldLvl="1" animBg="1" rev="0" advAuto="0" spid="256" grpId="30"/>
-      <p:bldP build="whole" bldLvl="1" animBg="1" rev="0" advAuto="0" spid="231" grpId="21"/>
-      <p:bldP build="whole" bldLvl="1" animBg="1" rev="0" advAuto="0" spid="236" grpId="5"/>
-      <p:bldP build="whole" bldLvl="1" animBg="1" rev="0" advAuto="0" spid="242" grpId="15"/>
-      <p:bldP build="whole" bldLvl="1" animBg="1" rev="0" advAuto="0" spid="234" grpId="32"/>
-      <p:bldP build="whole" bldLvl="1" animBg="1" rev="0" advAuto="0" spid="238" grpId="9"/>
-      <p:bldP build="whole" bldLvl="1" animBg="1" rev="0" advAuto="0" spid="251" grpId="24"/>
       <p:bldP build="whole" bldLvl="1" animBg="1" rev="0" advAuto="0" spid="233" grpId="31"/>
-      <p:bldP build="whole" bldLvl="1" animBg="1" rev="0" advAuto="0" spid="243" grpId="12"/>
-      <p:bldP build="whole" bldLvl="1" animBg="1" rev="0" advAuto="0" spid="247" grpId="20"/>
-      <p:bldP build="whole" bldLvl="1" animBg="1" rev="0" advAuto="0" spid="244" grpId="13"/>
-      <p:bldP build="whole" bldLvl="1" animBg="1" rev="0" advAuto="0" spid="240" grpId="7"/>
-      <p:bldP build="whole" bldLvl="1" animBg="1" rev="0" advAuto="0" spid="241" grpId="10"/>
-      <p:bldP build="whole" bldLvl="1" animBg="1" rev="0" advAuto="0" spid="245" grpId="14"/>
+      <p:bldP build="whole" bldLvl="1" animBg="1" rev="0" advAuto="0" spid="229" grpId="11"/>
     </p:bldLst>
   </p:timing>
 </p:sld>
@@ -45175,26 +45202,26 @@
       </p:par>
     </p:tnLst>
     <p:bldLst>
+      <p:bldP build="whole" bldLvl="1" animBg="1" rev="0" advAuto="0" spid="285" grpId="8"/>
+      <p:bldP build="p" bldLvl="5" animBg="1" rev="0" advAuto="0" spid="273" grpId="1"/>
+      <p:bldP build="whole" bldLvl="1" animBg="1" rev="0" advAuto="0" spid="285" grpId="10"/>
+      <p:bldP build="whole" bldLvl="1" animBg="1" rev="0" advAuto="0" spid="290" grpId="11"/>
+      <p:bldP build="whole" bldLvl="1" animBg="1" rev="0" advAuto="0" spid="291" grpId="18"/>
+      <p:bldP build="whole" bldLvl="1" animBg="1" rev="0" advAuto="0" spid="282" grpId="14"/>
+      <p:bldP build="p" bldLvl="5" animBg="1" rev="0" advAuto="0" spid="289" grpId="12"/>
+      <p:bldP build="whole" bldLvl="1" animBg="1" rev="0" advAuto="0" spid="287" grpId="6"/>
+      <p:bldP build="whole" bldLvl="1" animBg="1" rev="0" advAuto="0" spid="295" grpId="2"/>
+      <p:bldP build="whole" bldLvl="1" animBg="1" rev="0" advAuto="0" spid="290" grpId="13"/>
+      <p:bldP build="whole" bldLvl="1" animBg="1" rev="0" advAuto="0" spid="284" grpId="15"/>
+      <p:bldP build="p" bldLvl="5" animBg="1" rev="0" advAuto="0" spid="288" grpId="9"/>
+      <p:bldP build="p" bldLvl="5" animBg="1" rev="0" advAuto="0" spid="293" grpId="20"/>
       <p:bldP build="whole" bldLvl="1" animBg="1" rev="0" advAuto="0" spid="286" grpId="5"/>
-      <p:bldP build="whole" bldLvl="1" animBg="1" rev="0" advAuto="0" spid="291" grpId="18"/>
+      <p:bldP build="p" bldLvl="5" animBg="1" rev="0" advAuto="0" spid="292" grpId="19"/>
+      <p:bldP build="whole" bldLvl="1" animBg="1" rev="0" advAuto="0" spid="281" grpId="17"/>
       <p:bldP build="whole" bldLvl="1" animBg="1" rev="0" advAuto="0" spid="283" grpId="16"/>
-      <p:bldP build="whole" bldLvl="1" animBg="1" rev="0" advAuto="0" spid="282" grpId="14"/>
-      <p:bldP build="whole" bldLvl="1" animBg="1" rev="0" advAuto="0" spid="287" grpId="6"/>
-      <p:bldP build="p" bldLvl="5" animBg="1" rev="0" advAuto="0" spid="289" grpId="12"/>
-      <p:bldP build="whole" bldLvl="1" animBg="1" rev="0" advAuto="0" spid="295" grpId="2"/>
-      <p:bldP build="p" bldLvl="5" animBg="1" rev="0" advAuto="0" spid="288" grpId="9"/>
+      <p:bldP build="whole" bldLvl="1" animBg="1" rev="0" advAuto="0" spid="296" grpId="4"/>
       <p:bldP build="whole" bldLvl="1" animBg="1" rev="0" advAuto="0" spid="294" grpId="3"/>
-      <p:bldP build="whole" bldLvl="1" animBg="1" rev="0" advAuto="0" spid="281" grpId="17"/>
-      <p:bldP build="whole" bldLvl="1" animBg="1" rev="0" advAuto="0" spid="290" grpId="11"/>
-      <p:bldP build="p" bldLvl="5" animBg="1" rev="0" advAuto="0" spid="273" grpId="1"/>
-      <p:bldP build="whole" bldLvl="1" animBg="1" rev="0" advAuto="0" spid="290" grpId="13"/>
-      <p:bldP build="p" bldLvl="5" animBg="1" rev="0" advAuto="0" spid="293" grpId="20"/>
-      <p:bldP build="whole" bldLvl="1" animBg="1" rev="0" advAuto="0" spid="296" grpId="4"/>
-      <p:bldP build="whole" bldLvl="1" animBg="1" rev="0" advAuto="0" spid="285" grpId="8"/>
-      <p:bldP build="whole" bldLvl="1" animBg="1" rev="0" advAuto="0" spid="284" grpId="15"/>
-      <p:bldP build="whole" bldLvl="1" animBg="1" rev="0" advAuto="0" spid="285" grpId="10"/>
       <p:bldP build="whole" bldLvl="1" animBg="1" rev="0" advAuto="0" spid="282" grpId="7"/>
-      <p:bldP build="p" bldLvl="5" animBg="1" rev="0" advAuto="0" spid="292" grpId="19"/>
     </p:bldLst>
   </p:timing>
 </p:sld>

</xml_diff>